<commit_message>
[MEL-0004] - Adjusting icons and presentations for video recording
</commit_message>
<xml_diff>
--- a/Presentations/Promises.pptx
+++ b/Presentations/Promises.pptx
@@ -5,23 +5,25 @@
     <p:sldMasterId id="2147483648" r:id="rId1"/>
   </p:sldMasterIdLst>
   <p:notesMasterIdLst>
-    <p:notesMasterId r:id="rId16"/>
+    <p:notesMasterId r:id="rId18"/>
   </p:notesMasterIdLst>
   <p:sldIdLst>
-    <p:sldId id="315" r:id="rId2"/>
-    <p:sldId id="342" r:id="rId3"/>
-    <p:sldId id="354" r:id="rId4"/>
-    <p:sldId id="355" r:id="rId5"/>
-    <p:sldId id="356" r:id="rId6"/>
-    <p:sldId id="357" r:id="rId7"/>
-    <p:sldId id="358" r:id="rId8"/>
-    <p:sldId id="359" r:id="rId9"/>
-    <p:sldId id="360" r:id="rId10"/>
-    <p:sldId id="361" r:id="rId11"/>
-    <p:sldId id="362" r:id="rId12"/>
-    <p:sldId id="363" r:id="rId13"/>
-    <p:sldId id="364" r:id="rId14"/>
-    <p:sldId id="365" r:id="rId15"/>
+    <p:sldId id="366" r:id="rId2"/>
+    <p:sldId id="315" r:id="rId3"/>
+    <p:sldId id="342" r:id="rId4"/>
+    <p:sldId id="354" r:id="rId5"/>
+    <p:sldId id="355" r:id="rId6"/>
+    <p:sldId id="356" r:id="rId7"/>
+    <p:sldId id="357" r:id="rId8"/>
+    <p:sldId id="358" r:id="rId9"/>
+    <p:sldId id="359" r:id="rId10"/>
+    <p:sldId id="360" r:id="rId11"/>
+    <p:sldId id="361" r:id="rId12"/>
+    <p:sldId id="362" r:id="rId13"/>
+    <p:sldId id="363" r:id="rId14"/>
+    <p:sldId id="364" r:id="rId15"/>
+    <p:sldId id="365" r:id="rId16"/>
+    <p:sldId id="367" r:id="rId17"/>
   </p:sldIdLst>
   <p:sldSz cx="12192000" cy="6858000"/>
   <p:notesSz cx="6858000" cy="9144000"/>
@@ -210,7 +212,7 @@
           <a:p>
             <a:fld id="{BE922CAB-3410-47F5-A79E-CF5894AF3626}" type="datetimeFigureOut">
               <a:rPr lang="pt-PT" smtClean="0"/>
-              <a:t>29/07/2020</a:t>
+              <a:t>03/08/2020</a:t>
             </a:fld>
             <a:endParaRPr lang="pt-PT"/>
           </a:p>
@@ -627,7 +629,7 @@
           <a:p>
             <a:fld id="{A18E2B5E-2BAC-408C-9D01-DD90C7E8DCBE}" type="datetimeFigureOut">
               <a:rPr lang="pt-PT" smtClean="0"/>
-              <a:t>29/07/2020</a:t>
+              <a:t>03/08/2020</a:t>
             </a:fld>
             <a:endParaRPr lang="pt-PT"/>
           </a:p>
@@ -839,7 +841,7 @@
           <a:p>
             <a:fld id="{A18E2B5E-2BAC-408C-9D01-DD90C7E8DCBE}" type="datetimeFigureOut">
               <a:rPr lang="pt-PT" smtClean="0"/>
-              <a:t>29/07/2020</a:t>
+              <a:t>03/08/2020</a:t>
             </a:fld>
             <a:endParaRPr lang="pt-PT"/>
           </a:p>
@@ -1061,7 +1063,7 @@
           <a:p>
             <a:fld id="{A18E2B5E-2BAC-408C-9D01-DD90C7E8DCBE}" type="datetimeFigureOut">
               <a:rPr lang="pt-PT" smtClean="0"/>
-              <a:t>29/07/2020</a:t>
+              <a:t>03/08/2020</a:t>
             </a:fld>
             <a:endParaRPr lang="pt-PT"/>
           </a:p>
@@ -1273,7 +1275,7 @@
           <a:p>
             <a:fld id="{A18E2B5E-2BAC-408C-9D01-DD90C7E8DCBE}" type="datetimeFigureOut">
               <a:rPr lang="pt-PT" smtClean="0"/>
-              <a:t>29/07/2020</a:t>
+              <a:t>03/08/2020</a:t>
             </a:fld>
             <a:endParaRPr lang="pt-PT"/>
           </a:p>
@@ -1561,7 +1563,7 @@
           <a:p>
             <a:fld id="{A18E2B5E-2BAC-408C-9D01-DD90C7E8DCBE}" type="datetimeFigureOut">
               <a:rPr lang="pt-PT" smtClean="0"/>
-              <a:t>29/07/2020</a:t>
+              <a:t>03/08/2020</a:t>
             </a:fld>
             <a:endParaRPr lang="pt-PT"/>
           </a:p>
@@ -1841,7 +1843,7 @@
           <a:p>
             <a:fld id="{A18E2B5E-2BAC-408C-9D01-DD90C7E8DCBE}" type="datetimeFigureOut">
               <a:rPr lang="pt-PT" smtClean="0"/>
-              <a:t>29/07/2020</a:t>
+              <a:t>03/08/2020</a:t>
             </a:fld>
             <a:endParaRPr lang="pt-PT"/>
           </a:p>
@@ -2268,7 +2270,7 @@
           <a:p>
             <a:fld id="{A18E2B5E-2BAC-408C-9D01-DD90C7E8DCBE}" type="datetimeFigureOut">
               <a:rPr lang="pt-PT" smtClean="0"/>
-              <a:t>29/07/2020</a:t>
+              <a:t>03/08/2020</a:t>
             </a:fld>
             <a:endParaRPr lang="pt-PT"/>
           </a:p>
@@ -2422,7 +2424,7 @@
           <a:p>
             <a:fld id="{A18E2B5E-2BAC-408C-9D01-DD90C7E8DCBE}" type="datetimeFigureOut">
               <a:rPr lang="pt-PT" smtClean="0"/>
-              <a:t>29/07/2020</a:t>
+              <a:t>03/08/2020</a:t>
             </a:fld>
             <a:endParaRPr lang="pt-PT"/>
           </a:p>
@@ -2547,7 +2549,7 @@
           <a:p>
             <a:fld id="{A18E2B5E-2BAC-408C-9D01-DD90C7E8DCBE}" type="datetimeFigureOut">
               <a:rPr lang="pt-PT" smtClean="0"/>
-              <a:t>29/07/2020</a:t>
+              <a:t>03/08/2020</a:t>
             </a:fld>
             <a:endParaRPr lang="pt-PT"/>
           </a:p>
@@ -2872,7 +2874,7 @@
           <a:p>
             <a:fld id="{A18E2B5E-2BAC-408C-9D01-DD90C7E8DCBE}" type="datetimeFigureOut">
               <a:rPr lang="pt-PT" smtClean="0"/>
-              <a:t>29/07/2020</a:t>
+              <a:t>03/08/2020</a:t>
             </a:fld>
             <a:endParaRPr lang="pt-PT"/>
           </a:p>
@@ -3173,7 +3175,7 @@
           <a:p>
             <a:fld id="{A18E2B5E-2BAC-408C-9D01-DD90C7E8DCBE}" type="datetimeFigureOut">
               <a:rPr lang="pt-PT" smtClean="0"/>
-              <a:t>29/07/2020</a:t>
+              <a:t>03/08/2020</a:t>
             </a:fld>
             <a:endParaRPr lang="pt-PT"/>
           </a:p>
@@ -3428,7 +3430,7 @@
           <a:p>
             <a:fld id="{A18E2B5E-2BAC-408C-9D01-DD90C7E8DCBE}" type="datetimeFigureOut">
               <a:rPr lang="pt-PT" smtClean="0"/>
-              <a:t>29/07/2020</a:t>
+              <a:t>03/08/2020</a:t>
             </a:fld>
             <a:endParaRPr lang="pt-PT"/>
           </a:p>
@@ -3857,12 +3859,108 @@
           <a:chExt cx="0" cy="0"/>
         </a:xfrm>
       </p:grpSpPr>
+    </p:spTree>
+    <p:extLst>
+      <p:ext uri="{BB962C8B-B14F-4D97-AF65-F5344CB8AC3E}">
+        <p14:creationId xmlns:p14="http://schemas.microsoft.com/office/powerpoint/2010/main" val="545351314"/>
+      </p:ext>
+    </p:extLst>
+  </p:cSld>
+  <p:clrMapOvr>
+    <a:masterClrMapping/>
+  </p:clrMapOvr>
+  <mc:AlternateContent xmlns:mc="http://schemas.openxmlformats.org/markup-compatibility/2006" xmlns:p15="http://schemas.microsoft.com/office/powerpoint/2012/main">
+    <mc:Choice Requires="p15">
+      <p:transition xmlns:p14="http://schemas.microsoft.com/office/powerpoint/2010/main" spd="slow" p14:dur="1250">
+        <p15:prstTrans prst="peelOff"/>
+      </p:transition>
+    </mc:Choice>
+    <mc:Fallback xmlns="">
+      <p:transition spd="slow">
+        <p:fade/>
+      </p:transition>
+    </mc:Fallback>
+  </mc:AlternateContent>
+</p:sld>
+</file>
+
+<file path=ppt/slides/slide10.xml><?xml version="1.0" encoding="utf-8"?>
+<p:sld xmlns:a="http://schemas.openxmlformats.org/drawingml/2006/main" xmlns:r="http://schemas.openxmlformats.org/officeDocument/2006/relationships" xmlns:p="http://schemas.openxmlformats.org/presentationml/2006/main">
+  <p:cSld>
+    <p:spTree>
+      <p:nvGrpSpPr>
+        <p:cNvPr id="1" name=""/>
+        <p:cNvGrpSpPr/>
+        <p:nvPr/>
+      </p:nvGrpSpPr>
+      <p:grpSpPr>
+        <a:xfrm>
+          <a:off x="0" y="0"/>
+          <a:ext cx="0" cy="0"/>
+          <a:chOff x="0" y="0"/>
+          <a:chExt cx="0" cy="0"/>
+        </a:xfrm>
+      </p:grpSpPr>
+      <p:sp>
+        <p:nvSpPr>
+          <p:cNvPr id="20" name="Background">
+            <a:extLst>
+              <a:ext uri="{FF2B5EF4-FFF2-40B4-BE49-F238E27FC236}">
+                <a16:creationId xmlns:a16="http://schemas.microsoft.com/office/drawing/2014/main" id="{93C5F432-CE61-438A-AC80-8DF03B9FB67C}"/>
+              </a:ext>
+            </a:extLst>
+          </p:cNvPr>
+          <p:cNvSpPr/>
+          <p:nvPr/>
+        </p:nvSpPr>
+        <p:spPr>
+          <a:xfrm>
+            <a:off x="0" y="0"/>
+            <a:ext cx="12190646" cy="6858000"/>
+          </a:xfrm>
+          <a:prstGeom prst="rect">
+            <a:avLst/>
+          </a:prstGeom>
+          <a:solidFill>
+            <a:srgbClr val="5475B9"/>
+          </a:solidFill>
+          <a:ln>
+            <a:solidFill>
+              <a:srgbClr val="5475B9"/>
+            </a:solidFill>
+          </a:ln>
+        </p:spPr>
+        <p:style>
+          <a:lnRef idx="2">
+            <a:schemeClr val="accent1">
+              <a:shade val="50000"/>
+            </a:schemeClr>
+          </a:lnRef>
+          <a:fillRef idx="1">
+            <a:schemeClr val="accent1"/>
+          </a:fillRef>
+          <a:effectRef idx="0">
+            <a:schemeClr val="accent1"/>
+          </a:effectRef>
+          <a:fontRef idx="minor">
+            <a:schemeClr val="lt1"/>
+          </a:fontRef>
+        </p:style>
+        <p:txBody>
+          <a:bodyPr rtlCol="0" anchor="ctr"/>
+          <a:lstStyle/>
+          <a:p>
+            <a:pPr algn="ctr"/>
+            <a:endParaRPr lang="pt-PT"/>
+          </a:p>
+        </p:txBody>
+      </p:sp>
       <p:pic>
         <p:nvPicPr>
-          <p:cNvPr id="6" name="Landscape">
-            <a:extLst>
-              <a:ext uri="{FF2B5EF4-FFF2-40B4-BE49-F238E27FC236}">
-                <a16:creationId xmlns:a16="http://schemas.microsoft.com/office/drawing/2014/main" id="{D1A1C689-E2D2-4540-8CF4-5A7EB2D96A3C}"/>
+          <p:cNvPr id="5" name="Seal">
+            <a:extLst>
+              <a:ext uri="{FF2B5EF4-FFF2-40B4-BE49-F238E27FC236}">
+                <a16:creationId xmlns:a16="http://schemas.microsoft.com/office/drawing/2014/main" id="{F5A30996-7E87-4A4F-B2EC-1559590D8047}"/>
               </a:ext>
             </a:extLst>
           </p:cNvPr>
@@ -3888,20 +3986,117 @@
         </p:blipFill>
         <p:spPr>
           <a:xfrm>
-            <a:off x="-1219199" y="-1743100"/>
-            <a:ext cx="14630398" cy="10344200"/>
+            <a:off x="4909108" y="985657"/>
+            <a:ext cx="8385849" cy="5929086"/>
           </a:xfrm>
           <a:prstGeom prst="rect">
             <a:avLst/>
           </a:prstGeom>
         </p:spPr>
       </p:pic>
+      <p:grpSp>
+        <p:nvGrpSpPr>
+          <p:cNvPr id="19" name="Wrench">
+            <a:extLst>
+              <a:ext uri="{FF2B5EF4-FFF2-40B4-BE49-F238E27FC236}">
+                <a16:creationId xmlns:a16="http://schemas.microsoft.com/office/drawing/2014/main" id="{083C6A42-DF6D-4445-B2BA-0702070849A5}"/>
+              </a:ext>
+            </a:extLst>
+          </p:cNvPr>
+          <p:cNvGrpSpPr/>
+          <p:nvPr/>
+        </p:nvGrpSpPr>
+        <p:grpSpPr>
+          <a:xfrm>
+            <a:off x="164758" y="-1312798"/>
+            <a:ext cx="5120499" cy="5067191"/>
+            <a:chOff x="164758" y="-1312798"/>
+            <a:chExt cx="5120499" cy="5067191"/>
+          </a:xfrm>
+        </p:grpSpPr>
+        <p:pic>
+          <p:nvPicPr>
+            <p:cNvPr id="18" name="Wrench">
+              <a:extLst>
+                <a:ext uri="{FF2B5EF4-FFF2-40B4-BE49-F238E27FC236}">
+                  <a16:creationId xmlns:a16="http://schemas.microsoft.com/office/drawing/2014/main" id="{474B3EEE-8471-4C7D-A4D1-8FA16332ABBB}"/>
+                </a:ext>
+              </a:extLst>
+            </p:cNvPr>
+            <p:cNvPicPr>
+              <a:picLocks noChangeAspect="1"/>
+            </p:cNvPicPr>
+            <p:nvPr/>
+          </p:nvPicPr>
+          <p:blipFill rotWithShape="1">
+            <a:blip r:embed="rId4">
+              <a:extLst>
+                <a:ext uri="{28A0092B-C50C-407E-A947-70E740481C1C}">
+                  <a14:useLocalDpi xmlns:a14="http://schemas.microsoft.com/office/drawing/2010/main" val="0"/>
+                </a:ext>
+                <a:ext uri="{96DAC541-7B7A-43D3-8B79-37D633B846F1}">
+                  <asvg:svgBlip xmlns:asvg="http://schemas.microsoft.com/office/drawing/2016/SVG/main" r:embed="rId5"/>
+                </a:ext>
+              </a:extLst>
+            </a:blip>
+            <a:srcRect l="36162" t="9524" r="35835" b="7302"/>
+            <a:stretch/>
+          </p:blipFill>
+          <p:spPr>
+            <a:xfrm rot="18821662">
+              <a:off x="2065944" y="535080"/>
+              <a:ext cx="2076966" cy="4361660"/>
+            </a:xfrm>
+            <a:prstGeom prst="rect">
+              <a:avLst/>
+            </a:prstGeom>
+          </p:spPr>
+        </p:pic>
+        <p:pic>
+          <p:nvPicPr>
+            <p:cNvPr id="21" name="Wrench">
+              <a:extLst>
+                <a:ext uri="{FF2B5EF4-FFF2-40B4-BE49-F238E27FC236}">
+                  <a16:creationId xmlns:a16="http://schemas.microsoft.com/office/drawing/2014/main" id="{A04988F6-20D4-42E9-B332-EA49F17BFFDB}"/>
+                </a:ext>
+              </a:extLst>
+            </p:cNvPr>
+            <p:cNvPicPr>
+              <a:picLocks noChangeAspect="1"/>
+            </p:cNvPicPr>
+            <p:nvPr/>
+          </p:nvPicPr>
+          <p:blipFill rotWithShape="1">
+            <a:blip r:embed="rId6">
+              <a:extLst>
+                <a:ext uri="{28A0092B-C50C-407E-A947-70E740481C1C}">
+                  <a14:useLocalDpi xmlns:a14="http://schemas.microsoft.com/office/drawing/2010/main" val="0"/>
+                </a:ext>
+                <a:ext uri="{96DAC541-7B7A-43D3-8B79-37D633B846F1}">
+                  <asvg:svgBlip xmlns:asvg="http://schemas.microsoft.com/office/drawing/2016/SVG/main" r:embed="rId7"/>
+                </a:ext>
+              </a:extLst>
+            </a:blip>
+            <a:srcRect l="36162" t="9524" r="35835" b="7302"/>
+            <a:stretch/>
+          </p:blipFill>
+          <p:spPr>
+            <a:xfrm rot="8178338" flipH="1">
+              <a:off x="164758" y="-1312798"/>
+              <a:ext cx="2076966" cy="4361660"/>
+            </a:xfrm>
+            <a:prstGeom prst="rect">
+              <a:avLst/>
+            </a:prstGeom>
+          </p:spPr>
+        </p:pic>
+      </p:grpSp>
       <p:pic>
         <p:nvPicPr>
-          <p:cNvPr id="9" name="Graphic 8">
-            <a:extLst>
-              <a:ext uri="{FF2B5EF4-FFF2-40B4-BE49-F238E27FC236}">
-                <a16:creationId xmlns:a16="http://schemas.microsoft.com/office/drawing/2014/main" id="{EC53D01A-6CBD-43D5-B9B2-1459821251EE}"/>
+          <p:cNvPr id="34" name="Graphic 33">
+            <a:extLst>
+              <a:ext uri="{FF2B5EF4-FFF2-40B4-BE49-F238E27FC236}">
+                <a16:creationId xmlns:a16="http://schemas.microsoft.com/office/drawing/2014/main" id="{7AE9779E-6EE1-4C8C-A06C-2ABE0FD96C65}"/>
               </a:ext>
             </a:extLst>
           </p:cNvPr>
@@ -3911,13 +4106,13 @@
           <p:nvPr/>
         </p:nvPicPr>
         <p:blipFill>
-          <a:blip r:embed="rId4">
+          <a:blip r:embed="rId8">
             <a:extLst>
               <a:ext uri="{28A0092B-C50C-407E-A947-70E740481C1C}">
                 <a14:useLocalDpi xmlns:a14="http://schemas.microsoft.com/office/drawing/2010/main" val="0"/>
               </a:ext>
               <a:ext uri="{96DAC541-7B7A-43D3-8B79-37D633B846F1}">
-                <asvg:svgBlip xmlns:asvg="http://schemas.microsoft.com/office/drawing/2016/SVG/main" r:embed="rId5"/>
+                <asvg:svgBlip xmlns:asvg="http://schemas.microsoft.com/office/drawing/2016/SVG/main" r:embed="rId9"/>
               </a:ext>
             </a:extLst>
           </a:blip>
@@ -3927,8 +4122,8 @@
         </p:blipFill>
         <p:spPr>
           <a:xfrm>
-            <a:off x="-1002889" y="-882234"/>
-            <a:ext cx="14197778" cy="10038324"/>
+            <a:off x="8196918" y="2257131"/>
+            <a:ext cx="1810228" cy="1810228"/>
           </a:xfrm>
           <a:prstGeom prst="rect">
             <a:avLst/>
@@ -3938,7 +4133,7 @@
     </p:spTree>
     <p:extLst>
       <p:ext uri="{BB962C8B-B14F-4D97-AF65-F5344CB8AC3E}">
-        <p14:creationId xmlns:p14="http://schemas.microsoft.com/office/powerpoint/2010/main" val="2350256145"/>
+        <p14:creationId xmlns:p14="http://schemas.microsoft.com/office/powerpoint/2010/main" val="1971902515"/>
       </p:ext>
     </p:extLst>
   </p:cSld>
@@ -3981,7 +4176,7 @@
                             </p:stCondLst>
                             <p:childTnLst>
                               <p:par>
-                                <p:cTn id="5" presetID="10" presetClass="entr" presetSubtype="0" fill="hold" nodeType="afterEffect">
+                                <p:cTn id="5" presetID="2" presetClass="entr" presetSubtype="8" fill="hold" nodeType="withEffect">
                                   <p:stCondLst>
                                     <p:cond delay="0"/>
                                   </p:stCondLst>
@@ -3994,7 +4189,180 @@
                                           </p:stCondLst>
                                         </p:cTn>
                                         <p:tgtEl>
-                                          <p:spTgt spid="6"/>
+                                          <p:spTgt spid="19"/>
+                                        </p:tgtEl>
+                                        <p:attrNameLst>
+                                          <p:attrName>style.visibility</p:attrName>
+                                        </p:attrNameLst>
+                                      </p:cBhvr>
+                                      <p:to>
+                                        <p:strVal val="visible"/>
+                                      </p:to>
+                                    </p:set>
+                                    <p:anim calcmode="lin" valueType="num">
+                                      <p:cBhvr additive="base">
+                                        <p:cTn id="7" dur="500" fill="hold"/>
+                                        <p:tgtEl>
+                                          <p:spTgt spid="19"/>
+                                        </p:tgtEl>
+                                        <p:attrNameLst>
+                                          <p:attrName>ppt_x</p:attrName>
+                                        </p:attrNameLst>
+                                      </p:cBhvr>
+                                      <p:tavLst>
+                                        <p:tav tm="0">
+                                          <p:val>
+                                            <p:strVal val="0-#ppt_w/2"/>
+                                          </p:val>
+                                        </p:tav>
+                                        <p:tav tm="100000">
+                                          <p:val>
+                                            <p:strVal val="#ppt_x"/>
+                                          </p:val>
+                                        </p:tav>
+                                      </p:tavLst>
+                                    </p:anim>
+                                    <p:anim calcmode="lin" valueType="num">
+                                      <p:cBhvr additive="base">
+                                        <p:cTn id="8" dur="500" fill="hold"/>
+                                        <p:tgtEl>
+                                          <p:spTgt spid="19"/>
+                                        </p:tgtEl>
+                                        <p:attrNameLst>
+                                          <p:attrName>ppt_y</p:attrName>
+                                        </p:attrNameLst>
+                                      </p:cBhvr>
+                                      <p:tavLst>
+                                        <p:tav tm="0">
+                                          <p:val>
+                                            <p:strVal val="#ppt_y"/>
+                                          </p:val>
+                                        </p:tav>
+                                        <p:tav tm="100000">
+                                          <p:val>
+                                            <p:strVal val="#ppt_y"/>
+                                          </p:val>
+                                        </p:tav>
+                                      </p:tavLst>
+                                    </p:anim>
+                                  </p:childTnLst>
+                                </p:cTn>
+                              </p:par>
+                            </p:childTnLst>
+                          </p:cTn>
+                        </p:par>
+                      </p:childTnLst>
+                    </p:cTn>
+                  </p:par>
+                  <p:par>
+                    <p:cTn id="9" fill="hold">
+                      <p:stCondLst>
+                        <p:cond delay="indefinite"/>
+                      </p:stCondLst>
+                      <p:childTnLst>
+                        <p:par>
+                          <p:cTn id="10" fill="hold">
+                            <p:stCondLst>
+                              <p:cond delay="0"/>
+                            </p:stCondLst>
+                            <p:childTnLst>
+                              <p:par>
+                                <p:cTn id="11" presetID="2" presetClass="entr" presetSubtype="2" fill="hold" nodeType="clickEffect">
+                                  <p:stCondLst>
+                                    <p:cond delay="0"/>
+                                  </p:stCondLst>
+                                  <p:childTnLst>
+                                    <p:set>
+                                      <p:cBhvr>
+                                        <p:cTn id="12" dur="1" fill="hold">
+                                          <p:stCondLst>
+                                            <p:cond delay="0"/>
+                                          </p:stCondLst>
+                                        </p:cTn>
+                                        <p:tgtEl>
+                                          <p:spTgt spid="5"/>
+                                        </p:tgtEl>
+                                        <p:attrNameLst>
+                                          <p:attrName>style.visibility</p:attrName>
+                                        </p:attrNameLst>
+                                      </p:cBhvr>
+                                      <p:to>
+                                        <p:strVal val="visible"/>
+                                      </p:to>
+                                    </p:set>
+                                    <p:anim calcmode="lin" valueType="num">
+                                      <p:cBhvr additive="base">
+                                        <p:cTn id="13" dur="500" fill="hold"/>
+                                        <p:tgtEl>
+                                          <p:spTgt spid="5"/>
+                                        </p:tgtEl>
+                                        <p:attrNameLst>
+                                          <p:attrName>ppt_x</p:attrName>
+                                        </p:attrNameLst>
+                                      </p:cBhvr>
+                                      <p:tavLst>
+                                        <p:tav tm="0">
+                                          <p:val>
+                                            <p:strVal val="1+#ppt_w/2"/>
+                                          </p:val>
+                                        </p:tav>
+                                        <p:tav tm="100000">
+                                          <p:val>
+                                            <p:strVal val="#ppt_x"/>
+                                          </p:val>
+                                        </p:tav>
+                                      </p:tavLst>
+                                    </p:anim>
+                                    <p:anim calcmode="lin" valueType="num">
+                                      <p:cBhvr additive="base">
+                                        <p:cTn id="14" dur="500" fill="hold"/>
+                                        <p:tgtEl>
+                                          <p:spTgt spid="5"/>
+                                        </p:tgtEl>
+                                        <p:attrNameLst>
+                                          <p:attrName>ppt_y</p:attrName>
+                                        </p:attrNameLst>
+                                      </p:cBhvr>
+                                      <p:tavLst>
+                                        <p:tav tm="0">
+                                          <p:val>
+                                            <p:strVal val="#ppt_y"/>
+                                          </p:val>
+                                        </p:tav>
+                                        <p:tav tm="100000">
+                                          <p:val>
+                                            <p:strVal val="#ppt_y"/>
+                                          </p:val>
+                                        </p:tav>
+                                      </p:tavLst>
+                                    </p:anim>
+                                  </p:childTnLst>
+                                </p:cTn>
+                              </p:par>
+                            </p:childTnLst>
+                          </p:cTn>
+                        </p:par>
+                        <p:par>
+                          <p:cTn id="15" fill="hold">
+                            <p:stCondLst>
+                              <p:cond delay="500"/>
+                            </p:stCondLst>
+                            <p:childTnLst>
+                              <p:par>
+                                <p:cTn id="16" presetID="10" presetClass="entr" presetSubtype="0" fill="hold" nodeType="afterEffect">
+                                  <p:stCondLst>
+                                    <p:cond delay="0"/>
+                                  </p:stCondLst>
+                                  <p:childTnLst>
+                                    <p:set>
+                                      <p:cBhvr>
+                                        <p:cTn id="17" dur="1" fill="hold">
+                                          <p:stCondLst>
+                                            <p:cond delay="0"/>
+                                          </p:stCondLst>
+                                        </p:cTn>
+                                        <p:tgtEl>
+                                          <p:spTgt spid="34"/>
                                         </p:tgtEl>
                                         <p:attrNameLst>
                                           <p:attrName>style.visibility</p:attrName>
@@ -4006,9 +4374,9 @@
                                     </p:set>
                                     <p:animEffect transition="in" filter="fade">
                                       <p:cBhvr>
-                                        <p:cTn id="7" dur="500"/>
-                                        <p:tgtEl>
-                                          <p:spTgt spid="6"/>
+                                        <p:cTn id="18" dur="500"/>
+                                        <p:tgtEl>
+                                          <p:spTgt spid="34"/>
                                         </p:tgtEl>
                                       </p:cBhvr>
                                     </p:animEffect>
@@ -4019,87 +4387,109 @@
                           </p:cTn>
                         </p:par>
                         <p:par>
-                          <p:cTn id="8" fill="hold">
-                            <p:stCondLst>
-                              <p:cond delay="500"/>
-                            </p:stCondLst>
-                            <p:childTnLst>
-                              <p:par>
-                                <p:cTn id="9" presetID="10" presetClass="entr" presetSubtype="0" fill="hold" nodeType="afterEffect">
-                                  <p:stCondLst>
-                                    <p:cond delay="0"/>
-                                  </p:stCondLst>
-                                  <p:childTnLst>
-                                    <p:set>
-                                      <p:cBhvr>
-                                        <p:cTn id="10" dur="1" fill="hold">
-                                          <p:stCondLst>
-                                            <p:cond delay="0"/>
-                                          </p:stCondLst>
-                                        </p:cTn>
-                                        <p:tgtEl>
-                                          <p:spTgt spid="9"/>
-                                        </p:tgtEl>
-                                        <p:attrNameLst>
-                                          <p:attrName>style.visibility</p:attrName>
-                                        </p:attrNameLst>
-                                      </p:cBhvr>
-                                      <p:to>
-                                        <p:strVal val="visible"/>
-                                      </p:to>
-                                    </p:set>
-                                    <p:animEffect transition="in" filter="fade">
-                                      <p:cBhvr>
-                                        <p:cTn id="11" dur="500"/>
-                                        <p:tgtEl>
-                                          <p:spTgt spid="9"/>
-                                        </p:tgtEl>
-                                      </p:cBhvr>
-                                    </p:animEffect>
-                                  </p:childTnLst>
-                                </p:cTn>
-                              </p:par>
-                            </p:childTnLst>
-                          </p:cTn>
-                        </p:par>
-                        <p:par>
-                          <p:cTn id="12" fill="hold">
+                          <p:cTn id="19" fill="hold">
                             <p:stCondLst>
                               <p:cond delay="1000"/>
                             </p:stCondLst>
                             <p:childTnLst>
                               <p:par>
-                                <p:cTn id="13" presetID="6" presetClass="emph" presetSubtype="0" repeatCount="indefinite" autoRev="1" fill="hold" nodeType="afterEffect">
+                                <p:cTn id="20" presetID="32" presetClass="emph" presetSubtype="0" repeatCount="indefinite" fill="hold" nodeType="afterEffect">
+                                  <p:stCondLst>
+                                    <p:cond delay="0"/>
+                                  </p:stCondLst>
+                                  <p:childTnLst>
+                                    <p:animRot by="120000">
+                                      <p:cBhvr>
+                                        <p:cTn id="21" dur="300" fill="hold">
+                                          <p:stCondLst>
+                                            <p:cond delay="0"/>
+                                          </p:stCondLst>
+                                        </p:cTn>
+                                        <p:tgtEl>
+                                          <p:spTgt spid="19"/>
+                                        </p:tgtEl>
+                                        <p:attrNameLst>
+                                          <p:attrName>r</p:attrName>
+                                        </p:attrNameLst>
+                                      </p:cBhvr>
+                                    </p:animRot>
+                                    <p:animRot by="-240000">
+                                      <p:cBhvr>
+                                        <p:cTn id="22" dur="600" fill="hold">
+                                          <p:stCondLst>
+                                            <p:cond delay="600"/>
+                                          </p:stCondLst>
+                                        </p:cTn>
+                                        <p:tgtEl>
+                                          <p:spTgt spid="19"/>
+                                        </p:tgtEl>
+                                        <p:attrNameLst>
+                                          <p:attrName>r</p:attrName>
+                                        </p:attrNameLst>
+                                      </p:cBhvr>
+                                    </p:animRot>
+                                    <p:animRot by="240000">
+                                      <p:cBhvr>
+                                        <p:cTn id="23" dur="600" fill="hold">
+                                          <p:stCondLst>
+                                            <p:cond delay="1200"/>
+                                          </p:stCondLst>
+                                        </p:cTn>
+                                        <p:tgtEl>
+                                          <p:spTgt spid="19"/>
+                                        </p:tgtEl>
+                                        <p:attrNameLst>
+                                          <p:attrName>r</p:attrName>
+                                        </p:attrNameLst>
+                                      </p:cBhvr>
+                                    </p:animRot>
+                                    <p:animRot by="-240000">
+                                      <p:cBhvr>
+                                        <p:cTn id="24" dur="600" fill="hold">
+                                          <p:stCondLst>
+                                            <p:cond delay="1800"/>
+                                          </p:stCondLst>
+                                        </p:cTn>
+                                        <p:tgtEl>
+                                          <p:spTgt spid="19"/>
+                                        </p:tgtEl>
+                                        <p:attrNameLst>
+                                          <p:attrName>r</p:attrName>
+                                        </p:attrNameLst>
+                                      </p:cBhvr>
+                                    </p:animRot>
+                                    <p:animRot by="120000">
+                                      <p:cBhvr>
+                                        <p:cTn id="25" dur="600" fill="hold">
+                                          <p:stCondLst>
+                                            <p:cond delay="2400"/>
+                                          </p:stCondLst>
+                                        </p:cTn>
+                                        <p:tgtEl>
+                                          <p:spTgt spid="19"/>
+                                        </p:tgtEl>
+                                        <p:attrNameLst>
+                                          <p:attrName>r</p:attrName>
+                                        </p:attrNameLst>
+                                      </p:cBhvr>
+                                    </p:animRot>
+                                  </p:childTnLst>
+                                </p:cTn>
+                              </p:par>
+                              <p:par>
+                                <p:cTn id="26" presetID="6" presetClass="emph" presetSubtype="0" repeatCount="indefinite" autoRev="1" fill="hold" nodeType="withEffect">
                                   <p:stCondLst>
                                     <p:cond delay="0"/>
                                   </p:stCondLst>
                                   <p:childTnLst>
                                     <p:animScale>
                                       <p:cBhvr>
-                                        <p:cTn id="14" dur="5000" fill="hold"/>
-                                        <p:tgtEl>
-                                          <p:spTgt spid="6"/>
-                                        </p:tgtEl>
-                                      </p:cBhvr>
-                                      <p:by x="110000" y="110000"/>
-                                    </p:animScale>
-                                  </p:childTnLst>
-                                </p:cTn>
-                              </p:par>
-                              <p:par>
-                                <p:cTn id="15" presetID="6" presetClass="emph" presetSubtype="0" repeatCount="indefinite" autoRev="1" fill="hold" nodeType="withEffect">
-                                  <p:stCondLst>
-                                    <p:cond delay="0"/>
-                                  </p:stCondLst>
-                                  <p:childTnLst>
-                                    <p:animScale>
-                                      <p:cBhvr>
-                                        <p:cTn id="16" dur="5000" fill="hold"/>
-                                        <p:tgtEl>
-                                          <p:spTgt spid="9"/>
-                                        </p:tgtEl>
-                                      </p:cBhvr>
-                                      <p:by x="110000" y="110000"/>
+                                        <p:cTn id="27" dur="2000" fill="hold"/>
+                                        <p:tgtEl>
+                                          <p:spTgt spid="34"/>
+                                        </p:tgtEl>
+                                      </p:cBhvr>
+                                      <p:by x="125000" y="125000"/>
                                     </p:animScale>
                                   </p:childTnLst>
                                 </p:cTn>
@@ -4135,7 +4525,7 @@
 </p:sld>
 </file>
 
-<file path=ppt/slides/slide10.xml><?xml version="1.0" encoding="utf-8"?>
+<file path=ppt/slides/slide11.xml><?xml version="1.0" encoding="utf-8"?>
 <p:sld xmlns:a="http://schemas.openxmlformats.org/drawingml/2006/main" xmlns:r="http://schemas.openxmlformats.org/officeDocument/2006/relationships" xmlns:p="http://schemas.openxmlformats.org/presentationml/2006/main">
   <p:cSld>
     <p:spTree>
@@ -4354,7 +4744,7 @@
 </p:sld>
 </file>
 
-<file path=ppt/slides/slide11.xml><?xml version="1.0" encoding="utf-8"?>
+<file path=ppt/slides/slide12.xml><?xml version="1.0" encoding="utf-8"?>
 <p:sld xmlns:a="http://schemas.openxmlformats.org/drawingml/2006/main" xmlns:r="http://schemas.openxmlformats.org/officeDocument/2006/relationships" xmlns:p="http://schemas.openxmlformats.org/presentationml/2006/main">
   <p:cSld>
     <p:spTree>
@@ -4731,9 +5121,6 @@
                     <p:cTn id="3" fill="hold">
                       <p:stCondLst>
                         <p:cond delay="indefinite"/>
-                        <p:cond evt="onBegin" delay="0">
-                          <p:tn val="2"/>
-                        </p:cond>
                       </p:stCondLst>
                       <p:childTnLst>
                         <p:par>
@@ -4743,7 +5130,7 @@
                             </p:stCondLst>
                             <p:childTnLst>
                               <p:par>
-                                <p:cTn id="5" presetID="10" presetClass="entr" presetSubtype="0" fill="hold" nodeType="afterEffect">
+                                <p:cTn id="5" presetID="10" presetClass="entr" presetSubtype="0" fill="hold" nodeType="clickEffect">
                                   <p:stCondLst>
                                     <p:cond delay="0"/>
                                   </p:stCondLst>
@@ -4815,21 +5202,30 @@
                             </p:childTnLst>
                           </p:cTn>
                         </p:par>
+                      </p:childTnLst>
+                    </p:cTn>
+                  </p:par>
+                  <p:par>
+                    <p:cTn id="11" fill="hold">
+                      <p:stCondLst>
+                        <p:cond delay="indefinite"/>
+                      </p:stCondLst>
+                      <p:childTnLst>
                         <p:par>
-                          <p:cTn id="11" fill="hold">
+                          <p:cTn id="12" fill="hold">
                             <p:stCondLst>
-                              <p:cond delay="500"/>
+                              <p:cond delay="0"/>
                             </p:stCondLst>
                             <p:childTnLst>
                               <p:par>
-                                <p:cTn id="12" presetID="10" presetClass="entr" presetSubtype="0" fill="hold" nodeType="afterEffect">
+                                <p:cTn id="13" presetID="10" presetClass="entr" presetSubtype="0" fill="hold" nodeType="clickEffect">
                                   <p:stCondLst>
                                     <p:cond delay="0"/>
                                   </p:stCondLst>
                                   <p:childTnLst>
                                     <p:set>
                                       <p:cBhvr>
-                                        <p:cTn id="13" dur="1" fill="hold">
+                                        <p:cTn id="14" dur="1" fill="hold">
                                           <p:stCondLst>
                                             <p:cond delay="0"/>
                                           </p:stCondLst>
@@ -4847,7 +5243,7 @@
                                     </p:set>
                                     <p:animEffect transition="in" filter="fade">
                                       <p:cBhvr>
-                                        <p:cTn id="14" dur="500"/>
+                                        <p:cTn id="15" dur="500"/>
                                         <p:tgtEl>
                                           <p:spTgt spid="7"/>
                                         </p:tgtEl>
@@ -4860,20 +5256,20 @@
                           </p:cTn>
                         </p:par>
                         <p:par>
-                          <p:cTn id="15" fill="hold">
+                          <p:cTn id="16" fill="hold">
                             <p:stCondLst>
-                              <p:cond delay="1000"/>
+                              <p:cond delay="500"/>
                             </p:stCondLst>
                             <p:childTnLst>
                               <p:par>
-                                <p:cTn id="16" presetID="22" presetClass="entr" presetSubtype="4" fill="hold" nodeType="afterEffect">
+                                <p:cTn id="17" presetID="22" presetClass="entr" presetSubtype="4" fill="hold" nodeType="afterEffect">
                                   <p:stCondLst>
                                     <p:cond delay="0"/>
                                   </p:stCondLst>
                                   <p:childTnLst>
                                     <p:set>
                                       <p:cBhvr>
-                                        <p:cTn id="17" dur="1" fill="hold">
+                                        <p:cTn id="18" dur="1" fill="hold">
                                           <p:stCondLst>
                                             <p:cond delay="0"/>
                                           </p:stCondLst>
@@ -4891,9 +5287,62 @@
                                     </p:set>
                                     <p:animEffect transition="in" filter="wipe(down)">
                                       <p:cBhvr>
-                                        <p:cTn id="18" dur="500"/>
+                                        <p:cTn id="19" dur="500"/>
                                         <p:tgtEl>
                                           <p:spTgt spid="13"/>
+                                        </p:tgtEl>
+                                      </p:cBhvr>
+                                    </p:animEffect>
+                                  </p:childTnLst>
+                                </p:cTn>
+                              </p:par>
+                            </p:childTnLst>
+                          </p:cTn>
+                        </p:par>
+                      </p:childTnLst>
+                    </p:cTn>
+                  </p:par>
+                  <p:par>
+                    <p:cTn id="20" fill="hold">
+                      <p:stCondLst>
+                        <p:cond delay="indefinite"/>
+                      </p:stCondLst>
+                      <p:childTnLst>
+                        <p:par>
+                          <p:cTn id="21" fill="hold">
+                            <p:stCondLst>
+                              <p:cond delay="0"/>
+                            </p:stCondLst>
+                            <p:childTnLst>
+                              <p:par>
+                                <p:cTn id="22" presetID="10" presetClass="entr" presetSubtype="0" fill="hold" grpId="0" nodeType="clickEffect">
+                                  <p:stCondLst>
+                                    <p:cond delay="0"/>
+                                  </p:stCondLst>
+                                  <p:childTnLst>
+                                    <p:set>
+                                      <p:cBhvr>
+                                        <p:cTn id="23" dur="1" fill="hold">
+                                          <p:stCondLst>
+                                            <p:cond delay="0"/>
+                                          </p:stCondLst>
+                                        </p:cTn>
+                                        <p:tgtEl>
+                                          <p:spTgt spid="4"/>
+                                        </p:tgtEl>
+                                        <p:attrNameLst>
+                                          <p:attrName>style.visibility</p:attrName>
+                                        </p:attrNameLst>
+                                      </p:cBhvr>
+                                      <p:to>
+                                        <p:strVal val="visible"/>
+                                      </p:to>
+                                    </p:set>
+                                    <p:animEffect transition="in" filter="fade">
+                                      <p:cBhvr>
+                                        <p:cTn id="24" dur="500"/>
+                                        <p:tgtEl>
+                                          <p:spTgt spid="4"/>
                                         </p:tgtEl>
                                       </p:cBhvr>
                                     </p:animEffect>
@@ -4904,64 +5353,20 @@
                           </p:cTn>
                         </p:par>
                         <p:par>
-                          <p:cTn id="19" fill="hold">
+                          <p:cTn id="25" fill="hold">
                             <p:stCondLst>
-                              <p:cond delay="1500"/>
+                              <p:cond delay="500"/>
                             </p:stCondLst>
                             <p:childTnLst>
                               <p:par>
-                                <p:cTn id="20" presetID="10" presetClass="entr" presetSubtype="0" fill="hold" grpId="0" nodeType="afterEffect">
-                                  <p:stCondLst>
-                                    <p:cond delay="0"/>
-                                  </p:stCondLst>
-                                  <p:childTnLst>
-                                    <p:set>
-                                      <p:cBhvr>
-                                        <p:cTn id="21" dur="1" fill="hold">
-                                          <p:stCondLst>
-                                            <p:cond delay="0"/>
-                                          </p:stCondLst>
-                                        </p:cTn>
-                                        <p:tgtEl>
-                                          <p:spTgt spid="4"/>
-                                        </p:tgtEl>
-                                        <p:attrNameLst>
-                                          <p:attrName>style.visibility</p:attrName>
-                                        </p:attrNameLst>
-                                      </p:cBhvr>
-                                      <p:to>
-                                        <p:strVal val="visible"/>
-                                      </p:to>
-                                    </p:set>
-                                    <p:animEffect transition="in" filter="fade">
-                                      <p:cBhvr>
-                                        <p:cTn id="22" dur="500"/>
-                                        <p:tgtEl>
-                                          <p:spTgt spid="4"/>
-                                        </p:tgtEl>
-                                      </p:cBhvr>
-                                    </p:animEffect>
-                                  </p:childTnLst>
-                                </p:cTn>
-                              </p:par>
-                            </p:childTnLst>
-                          </p:cTn>
-                        </p:par>
-                        <p:par>
-                          <p:cTn id="23" fill="hold">
-                            <p:stCondLst>
-                              <p:cond delay="2000"/>
-                            </p:stCondLst>
-                            <p:childTnLst>
-                              <p:par>
-                                <p:cTn id="24" presetID="8" presetClass="emph" presetSubtype="0" repeatCount="indefinite" fill="hold" nodeType="afterEffect">
+                                <p:cTn id="26" presetID="8" presetClass="emph" presetSubtype="0" repeatCount="indefinite" fill="hold" nodeType="afterEffect">
                                   <p:stCondLst>
                                     <p:cond delay="0"/>
                                   </p:stCondLst>
                                   <p:childTnLst>
                                     <p:animRot by="21600000">
                                       <p:cBhvr>
-                                        <p:cTn id="25" dur="2000" fill="hold"/>
+                                        <p:cTn id="27" dur="2000" fill="hold"/>
                                         <p:tgtEl>
                                           <p:spTgt spid="8"/>
                                         </p:tgtEl>
@@ -4974,14 +5379,14 @@
                                 </p:cTn>
                               </p:par>
                               <p:par>
-                                <p:cTn id="26" presetID="8" presetClass="emph" presetSubtype="0" repeatCount="indefinite" fill="hold" nodeType="withEffect">
+                                <p:cTn id="28" presetID="8" presetClass="emph" presetSubtype="0" repeatCount="indefinite" fill="hold" nodeType="withEffect">
                                   <p:stCondLst>
                                     <p:cond delay="0"/>
                                   </p:stCondLst>
                                   <p:childTnLst>
                                     <p:animRot by="-21600000">
                                       <p:cBhvr>
-                                        <p:cTn id="27" dur="2000" fill="hold"/>
+                                        <p:cTn id="29" dur="2000" fill="hold"/>
                                         <p:tgtEl>
                                           <p:spTgt spid="9"/>
                                         </p:tgtEl>
@@ -4994,14 +5399,14 @@
                                 </p:cTn>
                               </p:par>
                               <p:par>
-                                <p:cTn id="28" presetID="6" presetClass="emph" presetSubtype="0" repeatCount="indefinite" autoRev="1" fill="hold" grpId="1" nodeType="withEffect">
+                                <p:cTn id="30" presetID="6" presetClass="emph" presetSubtype="0" repeatCount="indefinite" autoRev="1" fill="hold" grpId="1" nodeType="withEffect">
                                   <p:stCondLst>
                                     <p:cond delay="0"/>
                                   </p:stCondLst>
                                   <p:childTnLst>
                                     <p:animScale>
                                       <p:cBhvr>
-                                        <p:cTn id="29" dur="5000" fill="hold"/>
+                                        <p:cTn id="31" dur="5000" fill="hold"/>
                                         <p:tgtEl>
                                           <p:spTgt spid="4"/>
                                         </p:tgtEl>
@@ -5012,14 +5417,14 @@
                                 </p:cTn>
                               </p:par>
                               <p:par>
-                                <p:cTn id="30" presetID="8" presetClass="emph" presetSubtype="0" repeatCount="indefinite" autoRev="1" fill="remove" nodeType="withEffect">
+                                <p:cTn id="32" presetID="8" presetClass="emph" presetSubtype="0" repeatCount="indefinite" autoRev="1" fill="remove" nodeType="withEffect">
                                   <p:stCondLst>
                                     <p:cond delay="0"/>
                                   </p:stCondLst>
                                   <p:childTnLst>
                                     <p:animRot by="1800000">
                                       <p:cBhvr>
-                                        <p:cTn id="31" dur="3000" fill="hold"/>
+                                        <p:cTn id="33" dur="3000" fill="hold"/>
                                         <p:tgtEl>
                                           <p:spTgt spid="13"/>
                                         </p:tgtEl>
@@ -5066,7 +5471,7 @@
 </p:sld>
 </file>
 
-<file path=ppt/slides/slide12.xml><?xml version="1.0" encoding="utf-8"?>
+<file path=ppt/slides/slide13.xml><?xml version="1.0" encoding="utf-8"?>
 <p:sld xmlns:a="http://schemas.openxmlformats.org/drawingml/2006/main" xmlns:r="http://schemas.openxmlformats.org/officeDocument/2006/relationships" xmlns:p="http://schemas.openxmlformats.org/presentationml/2006/main">
   <p:cSld>
     <p:spTree>
@@ -5284,7 +5689,7 @@
 </p:sld>
 </file>
 
-<file path=ppt/slides/slide13.xml><?xml version="1.0" encoding="utf-8"?>
+<file path=ppt/slides/slide14.xml><?xml version="1.0" encoding="utf-8"?>
 <p:sld xmlns:a="http://schemas.openxmlformats.org/drawingml/2006/main" xmlns:r="http://schemas.openxmlformats.org/officeDocument/2006/relationships" xmlns:p="http://schemas.openxmlformats.org/presentationml/2006/main">
   <p:cSld>
     <p:spTree>
@@ -5396,7 +5801,7 @@
       </p:pic>
       <p:pic>
         <p:nvPicPr>
-          <p:cNvPr id="6" name="Graphic 5">
+          <p:cNvPr id="6" name="AngryFace">
             <a:extLst>
               <a:ext uri="{FF2B5EF4-FFF2-40B4-BE49-F238E27FC236}">
                 <a16:creationId xmlns:a16="http://schemas.microsoft.com/office/drawing/2014/main" id="{F82498DB-B4B7-4D2E-B59B-86C5D7241AA2}"/>
@@ -5435,7 +5840,7 @@
       </p:pic>
       <p:pic>
         <p:nvPicPr>
-          <p:cNvPr id="16" name="Graphic 15">
+          <p:cNvPr id="16" name="AngryEyes">
             <a:extLst>
               <a:ext uri="{FF2B5EF4-FFF2-40B4-BE49-F238E27FC236}">
                 <a16:creationId xmlns:a16="http://schemas.microsoft.com/office/drawing/2014/main" id="{BB834FED-816C-44FB-82AA-2AAECFA10A3F}"/>
@@ -5511,7 +5916,7 @@
       </p:pic>
       <p:pic>
         <p:nvPicPr>
-          <p:cNvPr id="25" name="Graphic 24">
+          <p:cNvPr id="25" name="AngryMouth">
             <a:extLst>
               <a:ext uri="{FF2B5EF4-FFF2-40B4-BE49-F238E27FC236}">
                 <a16:creationId xmlns:a16="http://schemas.microsoft.com/office/drawing/2014/main" id="{77DEF1E8-8832-45F0-AB8D-B9A053BE692F}"/>
@@ -5789,7 +6194,7 @@
       </p:sp>
       <p:pic>
         <p:nvPicPr>
-          <p:cNvPr id="38" name="Graphic 37">
+          <p:cNvPr id="38" name="angryVein">
             <a:extLst>
               <a:ext uri="{FF2B5EF4-FFF2-40B4-BE49-F238E27FC236}">
                 <a16:creationId xmlns:a16="http://schemas.microsoft.com/office/drawing/2014/main" id="{BDB31599-F966-4DE3-945D-3E66BD85F3BD}"/>
@@ -5860,9 +6265,6 @@
                     <p:cTn id="3" fill="hold">
                       <p:stCondLst>
                         <p:cond delay="indefinite"/>
-                        <p:cond evt="onBegin" delay="0">
-                          <p:tn val="2"/>
-                        </p:cond>
                       </p:stCondLst>
                       <p:childTnLst>
                         <p:par>
@@ -5872,7 +6274,7 @@
                             </p:stCondLst>
                             <p:childTnLst>
                               <p:par>
-                                <p:cTn id="5" presetID="10" presetClass="entr" presetSubtype="0" fill="hold" nodeType="withEffect">
+                                <p:cTn id="5" presetID="10" presetClass="entr" presetSubtype="0" fill="hold" nodeType="clickEffect">
                                   <p:stCondLst>
                                     <p:cond delay="0"/>
                                   </p:stCondLst>
@@ -5885,7 +6287,7 @@
                                           </p:stCondLst>
                                         </p:cTn>
                                         <p:tgtEl>
-                                          <p:spTgt spid="3"/>
+                                          <p:spTgt spid="6"/>
                                         </p:tgtEl>
                                         <p:attrNameLst>
                                           <p:attrName>style.visibility</p:attrName>
@@ -5899,7 +6301,7 @@
                                       <p:cBhvr>
                                         <p:cTn id="7" dur="500"/>
                                         <p:tgtEl>
-                                          <p:spTgt spid="3"/>
+                                          <p:spTgt spid="6"/>
                                         </p:tgtEl>
                                       </p:cBhvr>
                                     </p:animEffect>
@@ -5920,7 +6322,7 @@
                                           </p:stCondLst>
                                         </p:cTn>
                                         <p:tgtEl>
-                                          <p:spTgt spid="6"/>
+                                          <p:spTgt spid="16"/>
                                         </p:tgtEl>
                                         <p:attrNameLst>
                                           <p:attrName>style.visibility</p:attrName>
@@ -5934,7 +6336,7 @@
                                       <p:cBhvr>
                                         <p:cTn id="10" dur="500"/>
                                         <p:tgtEl>
-                                          <p:spTgt spid="6"/>
+                                          <p:spTgt spid="16"/>
                                         </p:tgtEl>
                                       </p:cBhvr>
                                     </p:animEffect>
@@ -5955,7 +6357,7 @@
                                           </p:stCondLst>
                                         </p:cTn>
                                         <p:tgtEl>
-                                          <p:spTgt spid="16"/>
+                                          <p:spTgt spid="25"/>
                                         </p:tgtEl>
                                         <p:attrNameLst>
                                           <p:attrName>style.visibility</p:attrName>
@@ -5969,7 +6371,7 @@
                                       <p:cBhvr>
                                         <p:cTn id="13" dur="500"/>
                                         <p:tgtEl>
-                                          <p:spTgt spid="16"/>
+                                          <p:spTgt spid="25"/>
                                         </p:tgtEl>
                                       </p:cBhvr>
                                     </p:animEffect>
@@ -5990,7 +6392,7 @@
                                           </p:stCondLst>
                                         </p:cTn>
                                         <p:tgtEl>
-                                          <p:spTgt spid="23"/>
+                                          <p:spTgt spid="27"/>
                                         </p:tgtEl>
                                         <p:attrNameLst>
                                           <p:attrName>style.visibility</p:attrName>
@@ -6004,7 +6406,7 @@
                                       <p:cBhvr>
                                         <p:cTn id="16" dur="500"/>
                                         <p:tgtEl>
-                                          <p:spTgt spid="23"/>
+                                          <p:spTgt spid="27"/>
                                         </p:tgtEl>
                                       </p:cBhvr>
                                     </p:animEffect>
@@ -6025,7 +6427,7 @@
                                           </p:stCondLst>
                                         </p:cTn>
                                         <p:tgtEl>
-                                          <p:spTgt spid="25"/>
+                                          <p:spTgt spid="38"/>
                                         </p:tgtEl>
                                         <p:attrNameLst>
                                           <p:attrName>style.visibility</p:attrName>
@@ -6039,7 +6441,60 @@
                                       <p:cBhvr>
                                         <p:cTn id="19" dur="500"/>
                                         <p:tgtEl>
-                                          <p:spTgt spid="25"/>
+                                          <p:spTgt spid="38"/>
+                                        </p:tgtEl>
+                                      </p:cBhvr>
+                                    </p:animEffect>
+                                  </p:childTnLst>
+                                </p:cTn>
+                              </p:par>
+                            </p:childTnLst>
+                          </p:cTn>
+                        </p:par>
+                      </p:childTnLst>
+                    </p:cTn>
+                  </p:par>
+                  <p:par>
+                    <p:cTn id="20" fill="hold">
+                      <p:stCondLst>
+                        <p:cond delay="indefinite"/>
+                      </p:stCondLst>
+                      <p:childTnLst>
+                        <p:par>
+                          <p:cTn id="21" fill="hold">
+                            <p:stCondLst>
+                              <p:cond delay="0"/>
+                            </p:stCondLst>
+                            <p:childTnLst>
+                              <p:par>
+                                <p:cTn id="22" presetID="10" presetClass="entr" presetSubtype="0" fill="hold" nodeType="clickEffect">
+                                  <p:stCondLst>
+                                    <p:cond delay="0"/>
+                                  </p:stCondLst>
+                                  <p:childTnLst>
+                                    <p:set>
+                                      <p:cBhvr>
+                                        <p:cTn id="23" dur="1" fill="hold">
+                                          <p:stCondLst>
+                                            <p:cond delay="0"/>
+                                          </p:stCondLst>
+                                        </p:cTn>
+                                        <p:tgtEl>
+                                          <p:spTgt spid="3"/>
+                                        </p:tgtEl>
+                                        <p:attrNameLst>
+                                          <p:attrName>style.visibility</p:attrName>
+                                        </p:attrNameLst>
+                                      </p:cBhvr>
+                                      <p:to>
+                                        <p:strVal val="visible"/>
+                                      </p:to>
+                                    </p:set>
+                                    <p:animEffect transition="in" filter="fade">
+                                      <p:cBhvr>
+                                        <p:cTn id="24" dur="500"/>
+                                        <p:tgtEl>
+                                          <p:spTgt spid="3"/>
                                         </p:tgtEl>
                                       </p:cBhvr>
                                     </p:animEffect>
@@ -6047,20 +6502,20 @@
                                 </p:cTn>
                               </p:par>
                               <p:par>
-                                <p:cTn id="20" presetID="10" presetClass="entr" presetSubtype="0" fill="hold" nodeType="withEffect">
+                                <p:cTn id="25" presetID="10" presetClass="entr" presetSubtype="0" fill="hold" nodeType="withEffect">
                                   <p:stCondLst>
                                     <p:cond delay="0"/>
                                   </p:stCondLst>
                                   <p:childTnLst>
                                     <p:set>
                                       <p:cBhvr>
-                                        <p:cTn id="21" dur="1" fill="hold">
+                                        <p:cTn id="26" dur="1" fill="hold">
                                           <p:stCondLst>
                                             <p:cond delay="0"/>
                                           </p:stCondLst>
                                         </p:cTn>
                                         <p:tgtEl>
-                                          <p:spTgt spid="27"/>
+                                          <p:spTgt spid="23"/>
                                         </p:tgtEl>
                                         <p:attrNameLst>
                                           <p:attrName>style.visibility</p:attrName>
@@ -6072,9 +6527,9 @@
                                     </p:set>
                                     <p:animEffect transition="in" filter="fade">
                                       <p:cBhvr>
-                                        <p:cTn id="22" dur="500"/>
-                                        <p:tgtEl>
-                                          <p:spTgt spid="27"/>
+                                        <p:cTn id="27" dur="500"/>
+                                        <p:tgtEl>
+                                          <p:spTgt spid="23"/>
                                         </p:tgtEl>
                                       </p:cBhvr>
                                     </p:animEffect>
@@ -6082,20 +6537,20 @@
                                 </p:cTn>
                               </p:par>
                               <p:par>
-                                <p:cTn id="23" presetID="10" presetClass="entr" presetSubtype="0" fill="hold" nodeType="withEffect">
+                                <p:cTn id="28" presetID="10" presetClass="entr" presetSubtype="0" fill="hold" nodeType="withEffect">
                                   <p:stCondLst>
                                     <p:cond delay="0"/>
                                   </p:stCondLst>
                                   <p:childTnLst>
                                     <p:set>
                                       <p:cBhvr>
-                                        <p:cTn id="24" dur="1" fill="hold">
+                                        <p:cTn id="29" dur="1" fill="hold">
                                           <p:stCondLst>
                                             <p:cond delay="0"/>
                                           </p:stCondLst>
                                         </p:cTn>
                                         <p:tgtEl>
-                                          <p:spTgt spid="38"/>
+                                          <p:spTgt spid="28"/>
                                         </p:tgtEl>
                                         <p:attrNameLst>
                                           <p:attrName>style.visibility</p:attrName>
@@ -6107,9 +6562,9 @@
                                     </p:set>
                                     <p:animEffect transition="in" filter="fade">
                                       <p:cBhvr>
-                                        <p:cTn id="25" dur="500"/>
-                                        <p:tgtEl>
-                                          <p:spTgt spid="38"/>
+                                        <p:cTn id="30" dur="500"/>
+                                        <p:tgtEl>
+                                          <p:spTgt spid="28"/>
                                         </p:tgtEl>
                                       </p:cBhvr>
                                     </p:animEffect>
@@ -6117,20 +6572,20 @@
                                 </p:cTn>
                               </p:par>
                               <p:par>
-                                <p:cTn id="26" presetID="10" presetClass="entr" presetSubtype="0" fill="hold" nodeType="withEffect">
+                                <p:cTn id="31" presetID="10" presetClass="entr" presetSubtype="0" fill="hold" grpId="0" nodeType="withEffect">
                                   <p:stCondLst>
                                     <p:cond delay="0"/>
                                   </p:stCondLst>
                                   <p:childTnLst>
                                     <p:set>
                                       <p:cBhvr>
-                                        <p:cTn id="27" dur="1" fill="hold">
+                                        <p:cTn id="32" dur="1" fill="hold">
                                           <p:stCondLst>
                                             <p:cond delay="0"/>
                                           </p:stCondLst>
                                         </p:cTn>
                                         <p:tgtEl>
-                                          <p:spTgt spid="28"/>
+                                          <p:spTgt spid="36"/>
                                         </p:tgtEl>
                                         <p:attrNameLst>
                                           <p:attrName>style.visibility</p:attrName>
@@ -6142,9 +6597,9 @@
                                     </p:set>
                                     <p:animEffect transition="in" filter="fade">
                                       <p:cBhvr>
-                                        <p:cTn id="28" dur="500"/>
-                                        <p:tgtEl>
-                                          <p:spTgt spid="28"/>
+                                        <p:cTn id="33" dur="500"/>
+                                        <p:tgtEl>
+                                          <p:spTgt spid="36"/>
                                         </p:tgtEl>
                                       </p:cBhvr>
                                     </p:animEffect>
@@ -6152,20 +6607,20 @@
                                 </p:cTn>
                               </p:par>
                               <p:par>
-                                <p:cTn id="29" presetID="10" presetClass="entr" presetSubtype="0" fill="hold" grpId="0" nodeType="withEffect">
+                                <p:cTn id="34" presetID="10" presetClass="entr" presetSubtype="0" fill="hold" grpId="0" nodeType="withEffect">
                                   <p:stCondLst>
                                     <p:cond delay="0"/>
                                   </p:stCondLst>
                                   <p:childTnLst>
                                     <p:set>
                                       <p:cBhvr>
-                                        <p:cTn id="30" dur="1" fill="hold">
+                                        <p:cTn id="35" dur="1" fill="hold">
                                           <p:stCondLst>
                                             <p:cond delay="0"/>
                                           </p:stCondLst>
                                         </p:cTn>
                                         <p:tgtEl>
-                                          <p:spTgt spid="36"/>
+                                          <p:spTgt spid="34"/>
                                         </p:tgtEl>
                                         <p:attrNameLst>
                                           <p:attrName>style.visibility</p:attrName>
@@ -6177,42 +6632,7 @@
                                     </p:set>
                                     <p:animEffect transition="in" filter="fade">
                                       <p:cBhvr>
-                                        <p:cTn id="31" dur="500"/>
-                                        <p:tgtEl>
-                                          <p:spTgt spid="36"/>
-                                        </p:tgtEl>
-                                      </p:cBhvr>
-                                    </p:animEffect>
-                                  </p:childTnLst>
-                                </p:cTn>
-                              </p:par>
-                              <p:par>
-                                <p:cTn id="32" presetID="10" presetClass="entr" presetSubtype="0" fill="hold" grpId="0" nodeType="withEffect">
-                                  <p:stCondLst>
-                                    <p:cond delay="0"/>
-                                  </p:stCondLst>
-                                  <p:childTnLst>
-                                    <p:set>
-                                      <p:cBhvr>
-                                        <p:cTn id="33" dur="1" fill="hold">
-                                          <p:stCondLst>
-                                            <p:cond delay="0"/>
-                                          </p:stCondLst>
-                                        </p:cTn>
-                                        <p:tgtEl>
-                                          <p:spTgt spid="34"/>
-                                        </p:tgtEl>
-                                        <p:attrNameLst>
-                                          <p:attrName>style.visibility</p:attrName>
-                                        </p:attrNameLst>
-                                      </p:cBhvr>
-                                      <p:to>
-                                        <p:strVal val="visible"/>
-                                      </p:to>
-                                    </p:set>
-                                    <p:animEffect transition="in" filter="fade">
-                                      <p:cBhvr>
-                                        <p:cTn id="34" dur="500"/>
+                                        <p:cTn id="36" dur="500"/>
                                         <p:tgtEl>
                                           <p:spTgt spid="34"/>
                                         </p:tgtEl>
@@ -6225,20 +6645,20 @@
                           </p:cTn>
                         </p:par>
                         <p:par>
-                          <p:cTn id="35" fill="hold">
+                          <p:cTn id="37" fill="hold">
                             <p:stCondLst>
                               <p:cond delay="500"/>
                             </p:stCondLst>
                             <p:childTnLst>
                               <p:par>
-                                <p:cTn id="36" presetID="42" presetClass="path" presetSubtype="0" repeatCount="indefinite" accel="50000" decel="50000" autoRev="1" fill="hold" nodeType="afterEffect">
+                                <p:cTn id="38" presetID="42" presetClass="path" presetSubtype="0" repeatCount="indefinite" accel="50000" decel="50000" autoRev="1" fill="hold" nodeType="afterEffect">
                                   <p:stCondLst>
                                     <p:cond delay="0"/>
                                   </p:stCondLst>
                                   <p:childTnLst>
                                     <p:animMotion origin="layout" path="M 0 -4.81481E-6 L -0.00065 0.01297 " pathEditMode="relative" rAng="0" ptsTypes="AA">
                                       <p:cBhvr>
-                                        <p:cTn id="37" dur="2000" fill="hold"/>
+                                        <p:cTn id="39" dur="2000" fill="hold"/>
                                         <p:tgtEl>
                                           <p:spTgt spid="27"/>
                                         </p:tgtEl>
@@ -6253,14 +6673,14 @@
                                 </p:cTn>
                               </p:par>
                               <p:par>
-                                <p:cTn id="38" presetID="42" presetClass="path" presetSubtype="0" repeatCount="indefinite" accel="50000" decel="50000" autoRev="1" fill="hold" nodeType="withEffect">
+                                <p:cTn id="40" presetID="42" presetClass="path" presetSubtype="0" repeatCount="indefinite" accel="50000" decel="50000" autoRev="1" fill="hold" nodeType="withEffect">
                                   <p:stCondLst>
                                     <p:cond delay="0"/>
                                   </p:stCondLst>
                                   <p:childTnLst>
                                     <p:animMotion origin="layout" path="M -1.66667E-6 3.33333E-6 L -1.66667E-6 -0.05 " pathEditMode="relative" rAng="0" ptsTypes="AA">
                                       <p:cBhvr>
-                                        <p:cTn id="39" dur="1000" fill="hold"/>
+                                        <p:cTn id="41" dur="1000" fill="hold"/>
                                         <p:tgtEl>
                                           <p:spTgt spid="28"/>
                                         </p:tgtEl>
@@ -6275,40 +6695,20 @@
                                 </p:cTn>
                               </p:par>
                               <p:par>
-                                <p:cTn id="40" presetID="6" presetClass="emph" presetSubtype="0" repeatCount="indefinite" autoRev="1" fill="hold" nodeType="withEffect">
+                                <p:cTn id="42" presetID="6" presetClass="emph" presetSubtype="0" repeatCount="indefinite" autoRev="1" fill="hold" nodeType="withEffect">
                                   <p:stCondLst>
                                     <p:cond delay="800"/>
                                   </p:stCondLst>
                                   <p:childTnLst>
                                     <p:animScale>
                                       <p:cBhvr>
-                                        <p:cTn id="41" dur="1000" fill="hold"/>
+                                        <p:cTn id="43" dur="1000" fill="hold"/>
                                         <p:tgtEl>
                                           <p:spTgt spid="38"/>
                                         </p:tgtEl>
                                       </p:cBhvr>
                                       <p:by x="125000" y="125000"/>
                                     </p:animScale>
-                                  </p:childTnLst>
-                                </p:cTn>
-                              </p:par>
-                              <p:par>
-                                <p:cTn id="42" presetID="8" presetClass="emph" presetSubtype="0" repeatCount="indefinite" fill="hold" grpId="1" nodeType="withEffect">
-                                  <p:stCondLst>
-                                    <p:cond delay="0"/>
-                                  </p:stCondLst>
-                                  <p:childTnLst>
-                                    <p:animRot by="21600000">
-                                      <p:cBhvr>
-                                        <p:cTn id="43" dur="3000" fill="hold"/>
-                                        <p:tgtEl>
-                                          <p:spTgt spid="36"/>
-                                        </p:tgtEl>
-                                        <p:attrNameLst>
-                                          <p:attrName>r</p:attrName>
-                                        </p:attrNameLst>
-                                      </p:cBhvr>
-                                    </p:animRot>
                                   </p:childTnLst>
                                 </p:cTn>
                               </p:par>
@@ -6321,6 +6721,26 @@
                                     <p:animRot by="21600000">
                                       <p:cBhvr>
                                         <p:cTn id="45" dur="3000" fill="hold"/>
+                                        <p:tgtEl>
+                                          <p:spTgt spid="36"/>
+                                        </p:tgtEl>
+                                        <p:attrNameLst>
+                                          <p:attrName>r</p:attrName>
+                                        </p:attrNameLst>
+                                      </p:cBhvr>
+                                    </p:animRot>
+                                  </p:childTnLst>
+                                </p:cTn>
+                              </p:par>
+                              <p:par>
+                                <p:cTn id="46" presetID="8" presetClass="emph" presetSubtype="0" repeatCount="indefinite" fill="hold" grpId="1" nodeType="withEffect">
+                                  <p:stCondLst>
+                                    <p:cond delay="0"/>
+                                  </p:stCondLst>
+                                  <p:childTnLst>
+                                    <p:animRot by="21600000">
+                                      <p:cBhvr>
+                                        <p:cTn id="47" dur="3000" fill="hold"/>
                                         <p:tgtEl>
                                           <p:spTgt spid="34"/>
                                         </p:tgtEl>
@@ -6369,7 +6789,7 @@
 </p:sld>
 </file>
 
-<file path=ppt/slides/slide14.xml><?xml version="1.0" encoding="utf-8"?>
+<file path=ppt/slides/slide15.xml><?xml version="1.0" encoding="utf-8"?>
 <p:sld xmlns:a="http://schemas.openxmlformats.org/drawingml/2006/main" xmlns:r="http://schemas.openxmlformats.org/officeDocument/2006/relationships" xmlns:p="http://schemas.openxmlformats.org/presentationml/2006/main">
   <p:cSld>
     <p:spTree>
@@ -6474,13 +6894,13 @@
   <p:clrMapOvr>
     <a:masterClrMapping/>
   </p:clrMapOvr>
-  <mc:AlternateContent xmlns:mc="http://schemas.openxmlformats.org/markup-compatibility/2006">
-    <mc:Choice xmlns:p15="http://schemas.microsoft.com/office/powerpoint/2012/main" Requires="p15">
+  <mc:AlternateContent xmlns:mc="http://schemas.openxmlformats.org/markup-compatibility/2006" xmlns:p15="http://schemas.microsoft.com/office/powerpoint/2012/main">
+    <mc:Choice Requires="p15">
       <p:transition xmlns:p14="http://schemas.microsoft.com/office/powerpoint/2010/main" spd="slow" p14:dur="1250">
         <p15:prstTrans prst="peelOff"/>
       </p:transition>
     </mc:Choice>
-    <mc:Fallback>
+    <mc:Fallback xmlns="">
       <p:transition spd="slow">
         <p:fade/>
       </p:transition>
@@ -6664,7 +7084,344 @@
 </p:sld>
 </file>
 
+<file path=ppt/slides/slide16.xml><?xml version="1.0" encoding="utf-8"?>
+<p:sld xmlns:a="http://schemas.openxmlformats.org/drawingml/2006/main" xmlns:r="http://schemas.openxmlformats.org/officeDocument/2006/relationships" xmlns:p="http://schemas.openxmlformats.org/presentationml/2006/main">
+  <p:cSld>
+    <p:spTree>
+      <p:nvGrpSpPr>
+        <p:cNvPr id="1" name=""/>
+        <p:cNvGrpSpPr/>
+        <p:nvPr/>
+      </p:nvGrpSpPr>
+      <p:grpSpPr>
+        <a:xfrm>
+          <a:off x="0" y="0"/>
+          <a:ext cx="0" cy="0"/>
+          <a:chOff x="0" y="0"/>
+          <a:chExt cx="0" cy="0"/>
+        </a:xfrm>
+      </p:grpSpPr>
+    </p:spTree>
+    <p:extLst>
+      <p:ext uri="{BB962C8B-B14F-4D97-AF65-F5344CB8AC3E}">
+        <p14:creationId xmlns:p14="http://schemas.microsoft.com/office/powerpoint/2010/main" val="1180636718"/>
+      </p:ext>
+    </p:extLst>
+  </p:cSld>
+  <p:clrMapOvr>
+    <a:masterClrMapping/>
+  </p:clrMapOvr>
+  <mc:AlternateContent xmlns:mc="http://schemas.openxmlformats.org/markup-compatibility/2006" xmlns:p15="http://schemas.microsoft.com/office/powerpoint/2012/main">
+    <mc:Choice Requires="p15">
+      <p:transition xmlns:p14="http://schemas.microsoft.com/office/powerpoint/2010/main" spd="slow" p14:dur="1250">
+        <p15:prstTrans prst="peelOff"/>
+      </p:transition>
+    </mc:Choice>
+    <mc:Fallback xmlns="">
+      <p:transition spd="slow">
+        <p:fade/>
+      </p:transition>
+    </mc:Fallback>
+  </mc:AlternateContent>
+</p:sld>
+</file>
+
 <file path=ppt/slides/slide2.xml><?xml version="1.0" encoding="utf-8"?>
+<p:sld xmlns:a="http://schemas.openxmlformats.org/drawingml/2006/main" xmlns:r="http://schemas.openxmlformats.org/officeDocument/2006/relationships" xmlns:p="http://schemas.openxmlformats.org/presentationml/2006/main">
+  <p:cSld>
+    <p:spTree>
+      <p:nvGrpSpPr>
+        <p:cNvPr id="1" name=""/>
+        <p:cNvGrpSpPr/>
+        <p:nvPr/>
+      </p:nvGrpSpPr>
+      <p:grpSpPr>
+        <a:xfrm>
+          <a:off x="0" y="0"/>
+          <a:ext cx="0" cy="0"/>
+          <a:chOff x="0" y="0"/>
+          <a:chExt cx="0" cy="0"/>
+        </a:xfrm>
+      </p:grpSpPr>
+      <p:pic>
+        <p:nvPicPr>
+          <p:cNvPr id="6" name="Landscape">
+            <a:extLst>
+              <a:ext uri="{FF2B5EF4-FFF2-40B4-BE49-F238E27FC236}">
+                <a16:creationId xmlns:a16="http://schemas.microsoft.com/office/drawing/2014/main" id="{D1A1C689-E2D2-4540-8CF4-5A7EB2D96A3C}"/>
+              </a:ext>
+            </a:extLst>
+          </p:cNvPr>
+          <p:cNvPicPr>
+            <a:picLocks noChangeAspect="1"/>
+          </p:cNvPicPr>
+          <p:nvPr/>
+        </p:nvPicPr>
+        <p:blipFill>
+          <a:blip r:embed="rId2">
+            <a:extLst>
+              <a:ext uri="{28A0092B-C50C-407E-A947-70E740481C1C}">
+                <a14:useLocalDpi xmlns:a14="http://schemas.microsoft.com/office/drawing/2010/main" val="0"/>
+              </a:ext>
+              <a:ext uri="{96DAC541-7B7A-43D3-8B79-37D633B846F1}">
+                <asvg:svgBlip xmlns:asvg="http://schemas.microsoft.com/office/drawing/2016/SVG/main" r:embed="rId3"/>
+              </a:ext>
+            </a:extLst>
+          </a:blip>
+          <a:stretch>
+            <a:fillRect/>
+          </a:stretch>
+        </p:blipFill>
+        <p:spPr>
+          <a:xfrm>
+            <a:off x="-1219199" y="-1743100"/>
+            <a:ext cx="14630398" cy="10344200"/>
+          </a:xfrm>
+          <a:prstGeom prst="rect">
+            <a:avLst/>
+          </a:prstGeom>
+        </p:spPr>
+      </p:pic>
+      <p:pic>
+        <p:nvPicPr>
+          <p:cNvPr id="9" name="Graphic 8">
+            <a:extLst>
+              <a:ext uri="{FF2B5EF4-FFF2-40B4-BE49-F238E27FC236}">
+                <a16:creationId xmlns:a16="http://schemas.microsoft.com/office/drawing/2014/main" id="{EC53D01A-6CBD-43D5-B9B2-1459821251EE}"/>
+              </a:ext>
+            </a:extLst>
+          </p:cNvPr>
+          <p:cNvPicPr>
+            <a:picLocks noChangeAspect="1"/>
+          </p:cNvPicPr>
+          <p:nvPr/>
+        </p:nvPicPr>
+        <p:blipFill>
+          <a:blip r:embed="rId4">
+            <a:extLst>
+              <a:ext uri="{28A0092B-C50C-407E-A947-70E740481C1C}">
+                <a14:useLocalDpi xmlns:a14="http://schemas.microsoft.com/office/drawing/2010/main" val="0"/>
+              </a:ext>
+              <a:ext uri="{96DAC541-7B7A-43D3-8B79-37D633B846F1}">
+                <asvg:svgBlip xmlns:asvg="http://schemas.microsoft.com/office/drawing/2016/SVG/main" r:embed="rId5"/>
+              </a:ext>
+            </a:extLst>
+          </a:blip>
+          <a:stretch>
+            <a:fillRect/>
+          </a:stretch>
+        </p:blipFill>
+        <p:spPr>
+          <a:xfrm>
+            <a:off x="-1002889" y="-882234"/>
+            <a:ext cx="14197778" cy="10038324"/>
+          </a:xfrm>
+          <a:prstGeom prst="rect">
+            <a:avLst/>
+          </a:prstGeom>
+        </p:spPr>
+      </p:pic>
+    </p:spTree>
+    <p:extLst>
+      <p:ext uri="{BB962C8B-B14F-4D97-AF65-F5344CB8AC3E}">
+        <p14:creationId xmlns:p14="http://schemas.microsoft.com/office/powerpoint/2010/main" val="2350256145"/>
+      </p:ext>
+    </p:extLst>
+  </p:cSld>
+  <p:clrMapOvr>
+    <a:masterClrMapping/>
+  </p:clrMapOvr>
+  <mc:AlternateContent xmlns:mc="http://schemas.openxmlformats.org/markup-compatibility/2006" xmlns:p15="http://schemas.microsoft.com/office/powerpoint/2012/main">
+    <mc:Choice Requires="p15">
+      <p:transition xmlns:p14="http://schemas.microsoft.com/office/powerpoint/2010/main" spd="slow" p14:dur="1250">
+        <p15:prstTrans prst="peelOff"/>
+      </p:transition>
+    </mc:Choice>
+    <mc:Fallback xmlns="">
+      <p:transition spd="slow">
+        <p:fade/>
+      </p:transition>
+    </mc:Fallback>
+  </mc:AlternateContent>
+  <p:timing>
+    <p:tnLst>
+      <p:par>
+        <p:cTn id="1" dur="indefinite" restart="never" nodeType="tmRoot">
+          <p:childTnLst>
+            <p:seq concurrent="1" nextAc="seek">
+              <p:cTn id="2" dur="indefinite" nodeType="mainSeq">
+                <p:childTnLst>
+                  <p:par>
+                    <p:cTn id="3" fill="hold">
+                      <p:stCondLst>
+                        <p:cond delay="indefinite"/>
+                        <p:cond evt="onBegin" delay="0">
+                          <p:tn val="2"/>
+                        </p:cond>
+                      </p:stCondLst>
+                      <p:childTnLst>
+                        <p:par>
+                          <p:cTn id="4" fill="hold">
+                            <p:stCondLst>
+                              <p:cond delay="0"/>
+                            </p:stCondLst>
+                            <p:childTnLst>
+                              <p:par>
+                                <p:cTn id="5" presetID="10" presetClass="entr" presetSubtype="0" fill="hold" nodeType="afterEffect">
+                                  <p:stCondLst>
+                                    <p:cond delay="0"/>
+                                  </p:stCondLst>
+                                  <p:childTnLst>
+                                    <p:set>
+                                      <p:cBhvr>
+                                        <p:cTn id="6" dur="1" fill="hold">
+                                          <p:stCondLst>
+                                            <p:cond delay="0"/>
+                                          </p:stCondLst>
+                                        </p:cTn>
+                                        <p:tgtEl>
+                                          <p:spTgt spid="6"/>
+                                        </p:tgtEl>
+                                        <p:attrNameLst>
+                                          <p:attrName>style.visibility</p:attrName>
+                                        </p:attrNameLst>
+                                      </p:cBhvr>
+                                      <p:to>
+                                        <p:strVal val="visible"/>
+                                      </p:to>
+                                    </p:set>
+                                    <p:animEffect transition="in" filter="fade">
+                                      <p:cBhvr>
+                                        <p:cTn id="7" dur="500"/>
+                                        <p:tgtEl>
+                                          <p:spTgt spid="6"/>
+                                        </p:tgtEl>
+                                      </p:cBhvr>
+                                    </p:animEffect>
+                                  </p:childTnLst>
+                                </p:cTn>
+                              </p:par>
+                            </p:childTnLst>
+                          </p:cTn>
+                        </p:par>
+                        <p:par>
+                          <p:cTn id="8" fill="hold">
+                            <p:stCondLst>
+                              <p:cond delay="500"/>
+                            </p:stCondLst>
+                            <p:childTnLst>
+                              <p:par>
+                                <p:cTn id="9" presetID="10" presetClass="entr" presetSubtype="0" fill="hold" nodeType="afterEffect">
+                                  <p:stCondLst>
+                                    <p:cond delay="0"/>
+                                  </p:stCondLst>
+                                  <p:childTnLst>
+                                    <p:set>
+                                      <p:cBhvr>
+                                        <p:cTn id="10" dur="1" fill="hold">
+                                          <p:stCondLst>
+                                            <p:cond delay="0"/>
+                                          </p:stCondLst>
+                                        </p:cTn>
+                                        <p:tgtEl>
+                                          <p:spTgt spid="9"/>
+                                        </p:tgtEl>
+                                        <p:attrNameLst>
+                                          <p:attrName>style.visibility</p:attrName>
+                                        </p:attrNameLst>
+                                      </p:cBhvr>
+                                      <p:to>
+                                        <p:strVal val="visible"/>
+                                      </p:to>
+                                    </p:set>
+                                    <p:animEffect transition="in" filter="fade">
+                                      <p:cBhvr>
+                                        <p:cTn id="11" dur="500"/>
+                                        <p:tgtEl>
+                                          <p:spTgt spid="9"/>
+                                        </p:tgtEl>
+                                      </p:cBhvr>
+                                    </p:animEffect>
+                                  </p:childTnLst>
+                                </p:cTn>
+                              </p:par>
+                            </p:childTnLst>
+                          </p:cTn>
+                        </p:par>
+                        <p:par>
+                          <p:cTn id="12" fill="hold">
+                            <p:stCondLst>
+                              <p:cond delay="1000"/>
+                            </p:stCondLst>
+                            <p:childTnLst>
+                              <p:par>
+                                <p:cTn id="13" presetID="6" presetClass="emph" presetSubtype="0" repeatCount="indefinite" autoRev="1" fill="hold" nodeType="afterEffect">
+                                  <p:stCondLst>
+                                    <p:cond delay="0"/>
+                                  </p:stCondLst>
+                                  <p:childTnLst>
+                                    <p:animScale>
+                                      <p:cBhvr>
+                                        <p:cTn id="14" dur="5000" fill="hold"/>
+                                        <p:tgtEl>
+                                          <p:spTgt spid="6"/>
+                                        </p:tgtEl>
+                                      </p:cBhvr>
+                                      <p:by x="110000" y="110000"/>
+                                    </p:animScale>
+                                  </p:childTnLst>
+                                </p:cTn>
+                              </p:par>
+                              <p:par>
+                                <p:cTn id="15" presetID="6" presetClass="emph" presetSubtype="0" repeatCount="indefinite" autoRev="1" fill="hold" nodeType="withEffect">
+                                  <p:stCondLst>
+                                    <p:cond delay="0"/>
+                                  </p:stCondLst>
+                                  <p:childTnLst>
+                                    <p:animScale>
+                                      <p:cBhvr>
+                                        <p:cTn id="16" dur="5000" fill="hold"/>
+                                        <p:tgtEl>
+                                          <p:spTgt spid="9"/>
+                                        </p:tgtEl>
+                                      </p:cBhvr>
+                                      <p:by x="110000" y="110000"/>
+                                    </p:animScale>
+                                  </p:childTnLst>
+                                </p:cTn>
+                              </p:par>
+                            </p:childTnLst>
+                          </p:cTn>
+                        </p:par>
+                      </p:childTnLst>
+                    </p:cTn>
+                  </p:par>
+                </p:childTnLst>
+              </p:cTn>
+              <p:prevCondLst>
+                <p:cond evt="onPrev" delay="0">
+                  <p:tgtEl>
+                    <p:sldTgt/>
+                  </p:tgtEl>
+                </p:cond>
+              </p:prevCondLst>
+              <p:nextCondLst>
+                <p:cond evt="onNext" delay="0">
+                  <p:tgtEl>
+                    <p:sldTgt/>
+                  </p:tgtEl>
+                </p:cond>
+              </p:nextCondLst>
+            </p:seq>
+          </p:childTnLst>
+        </p:cTn>
+      </p:par>
+    </p:tnLst>
+  </p:timing>
+</p:sld>
+</file>
+
+<file path=ppt/slides/slide3.xml><?xml version="1.0" encoding="utf-8"?>
 <p:sld xmlns:a="http://schemas.openxmlformats.org/drawingml/2006/main" xmlns:r="http://schemas.openxmlformats.org/officeDocument/2006/relationships" xmlns:p="http://schemas.openxmlformats.org/presentationml/2006/main">
   <p:cSld>
     <p:spTree>
@@ -7928,7 +8685,7 @@
 </p:sld>
 </file>
 
-<file path=ppt/slides/slide3.xml><?xml version="1.0" encoding="utf-8"?>
+<file path=ppt/slides/slide4.xml><?xml version="1.0" encoding="utf-8"?>
 <p:sld xmlns:a="http://schemas.openxmlformats.org/drawingml/2006/main" xmlns:r="http://schemas.openxmlformats.org/officeDocument/2006/relationships" xmlns:p="http://schemas.openxmlformats.org/presentationml/2006/main">
   <p:cSld>
     <p:spTree>
@@ -8669,7 +9426,7 @@
 </p:sld>
 </file>
 
-<file path=ppt/slides/slide4.xml><?xml version="1.0" encoding="utf-8"?>
+<file path=ppt/slides/slide5.xml><?xml version="1.0" encoding="utf-8"?>
 <p:sld xmlns:a="http://schemas.openxmlformats.org/drawingml/2006/main" xmlns:r="http://schemas.openxmlformats.org/officeDocument/2006/relationships" xmlns:p="http://schemas.openxmlformats.org/presentationml/2006/main">
   <p:cSld>
     <p:spTree>
@@ -9257,7 +10014,7 @@
                         <p:par>
                           <p:cTn id="4" fill="hold">
                             <p:stCondLst>
-                              <p:cond delay="1000"/>
+                              <p:cond delay="0"/>
                             </p:stCondLst>
                             <p:childTnLst>
                               <p:par>
@@ -9274,7 +10031,7 @@
                                           </p:stCondLst>
                                         </p:cTn>
                                         <p:tgtEl>
-                                          <p:spTgt spid="4"/>
+                                          <p:spTgt spid="13"/>
                                         </p:tgtEl>
                                         <p:attrNameLst>
                                           <p:attrName>style.visibility</p:attrName>
@@ -9288,7 +10045,395 @@
                                       <p:cBhvr>
                                         <p:cTn id="7" dur="500"/>
                                         <p:tgtEl>
+                                          <p:spTgt spid="13"/>
+                                        </p:tgtEl>
+                                      </p:cBhvr>
+                                    </p:animEffect>
+                                  </p:childTnLst>
+                                </p:cTn>
+                              </p:par>
+                              <p:par>
+                                <p:cTn id="8" presetID="10" presetClass="entr" presetSubtype="0" fill="hold" nodeType="withEffect">
+                                  <p:stCondLst>
+                                    <p:cond delay="0"/>
+                                  </p:stCondLst>
+                                  <p:childTnLst>
+                                    <p:set>
+                                      <p:cBhvr>
+                                        <p:cTn id="9" dur="1" fill="hold">
+                                          <p:stCondLst>
+                                            <p:cond delay="0"/>
+                                          </p:stCondLst>
+                                        </p:cTn>
+                                        <p:tgtEl>
+                                          <p:spTgt spid="38"/>
+                                        </p:tgtEl>
+                                        <p:attrNameLst>
+                                          <p:attrName>style.visibility</p:attrName>
+                                        </p:attrNameLst>
+                                      </p:cBhvr>
+                                      <p:to>
+                                        <p:strVal val="visible"/>
+                                      </p:to>
+                                    </p:set>
+                                    <p:animEffect transition="in" filter="fade">
+                                      <p:cBhvr>
+                                        <p:cTn id="10" dur="500"/>
+                                        <p:tgtEl>
+                                          <p:spTgt spid="38"/>
+                                        </p:tgtEl>
+                                      </p:cBhvr>
+                                    </p:animEffect>
+                                  </p:childTnLst>
+                                </p:cTn>
+                              </p:par>
+                              <p:par>
+                                <p:cTn id="11" presetID="10" presetClass="entr" presetSubtype="0" fill="hold" nodeType="withEffect">
+                                  <p:stCondLst>
+                                    <p:cond delay="0"/>
+                                  </p:stCondLst>
+                                  <p:childTnLst>
+                                    <p:set>
+                                      <p:cBhvr>
+                                        <p:cTn id="12" dur="1" fill="hold">
+                                          <p:stCondLst>
+                                            <p:cond delay="0"/>
+                                          </p:stCondLst>
+                                        </p:cTn>
+                                        <p:tgtEl>
+                                          <p:spTgt spid="33"/>
+                                        </p:tgtEl>
+                                        <p:attrNameLst>
+                                          <p:attrName>style.visibility</p:attrName>
+                                        </p:attrNameLst>
+                                      </p:cBhvr>
+                                      <p:to>
+                                        <p:strVal val="visible"/>
+                                      </p:to>
+                                    </p:set>
+                                    <p:animEffect transition="in" filter="fade">
+                                      <p:cBhvr>
+                                        <p:cTn id="13" dur="500"/>
+                                        <p:tgtEl>
+                                          <p:spTgt spid="33"/>
+                                        </p:tgtEl>
+                                      </p:cBhvr>
+                                    </p:animEffect>
+                                  </p:childTnLst>
+                                </p:cTn>
+                              </p:par>
+                            </p:childTnLst>
+                          </p:cTn>
+                        </p:par>
+                      </p:childTnLst>
+                    </p:cTn>
+                  </p:par>
+                  <p:par>
+                    <p:cTn id="14" fill="hold">
+                      <p:stCondLst>
+                        <p:cond delay="indefinite"/>
+                      </p:stCondLst>
+                      <p:childTnLst>
+                        <p:par>
+                          <p:cTn id="15" fill="hold">
+                            <p:stCondLst>
+                              <p:cond delay="0"/>
+                            </p:stCondLst>
+                            <p:childTnLst>
+                              <p:par>
+                                <p:cTn id="16" presetID="10" presetClass="entr" presetSubtype="0" fill="hold" nodeType="clickEffect">
+                                  <p:stCondLst>
+                                    <p:cond delay="0"/>
+                                  </p:stCondLst>
+                                  <p:childTnLst>
+                                    <p:set>
+                                      <p:cBhvr>
+                                        <p:cTn id="17" dur="1" fill="hold">
+                                          <p:stCondLst>
+                                            <p:cond delay="0"/>
+                                          </p:stCondLst>
+                                        </p:cTn>
+                                        <p:tgtEl>
                                           <p:spTgt spid="4"/>
+                                        </p:tgtEl>
+                                        <p:attrNameLst>
+                                          <p:attrName>style.visibility</p:attrName>
+                                        </p:attrNameLst>
+                                      </p:cBhvr>
+                                      <p:to>
+                                        <p:strVal val="visible"/>
+                                      </p:to>
+                                    </p:set>
+                                    <p:animEffect transition="in" filter="fade">
+                                      <p:cBhvr>
+                                        <p:cTn id="18" dur="500"/>
+                                        <p:tgtEl>
+                                          <p:spTgt spid="4"/>
+                                        </p:tgtEl>
+                                      </p:cBhvr>
+                                    </p:animEffect>
+                                  </p:childTnLst>
+                                </p:cTn>
+                              </p:par>
+                            </p:childTnLst>
+                          </p:cTn>
+                        </p:par>
+                      </p:childTnLst>
+                    </p:cTn>
+                  </p:par>
+                  <p:par>
+                    <p:cTn id="19" fill="hold">
+                      <p:stCondLst>
+                        <p:cond delay="indefinite"/>
+                      </p:stCondLst>
+                      <p:childTnLst>
+                        <p:par>
+                          <p:cTn id="20" fill="hold">
+                            <p:stCondLst>
+                              <p:cond delay="0"/>
+                            </p:stCondLst>
+                            <p:childTnLst>
+                              <p:par>
+                                <p:cTn id="21" presetID="10" presetClass="entr" presetSubtype="0" fill="hold" nodeType="clickEffect">
+                                  <p:stCondLst>
+                                    <p:cond delay="0"/>
+                                  </p:stCondLst>
+                                  <p:childTnLst>
+                                    <p:set>
+                                      <p:cBhvr>
+                                        <p:cTn id="22" dur="1" fill="hold">
+                                          <p:stCondLst>
+                                            <p:cond delay="0"/>
+                                          </p:stCondLst>
+                                        </p:cTn>
+                                        <p:tgtEl>
+                                          <p:spTgt spid="8"/>
+                                        </p:tgtEl>
+                                        <p:attrNameLst>
+                                          <p:attrName>style.visibility</p:attrName>
+                                        </p:attrNameLst>
+                                      </p:cBhvr>
+                                      <p:to>
+                                        <p:strVal val="visible"/>
+                                      </p:to>
+                                    </p:set>
+                                    <p:animEffect transition="in" filter="fade">
+                                      <p:cBhvr>
+                                        <p:cTn id="23" dur="500"/>
+                                        <p:tgtEl>
+                                          <p:spTgt spid="8"/>
+                                        </p:tgtEl>
+                                      </p:cBhvr>
+                                    </p:animEffect>
+                                  </p:childTnLst>
+                                </p:cTn>
+                              </p:par>
+                            </p:childTnLst>
+                          </p:cTn>
+                        </p:par>
+                      </p:childTnLst>
+                    </p:cTn>
+                  </p:par>
+                  <p:par>
+                    <p:cTn id="24" fill="hold">
+                      <p:stCondLst>
+                        <p:cond delay="indefinite"/>
+                      </p:stCondLst>
+                      <p:childTnLst>
+                        <p:par>
+                          <p:cTn id="25" fill="hold">
+                            <p:stCondLst>
+                              <p:cond delay="0"/>
+                            </p:stCondLst>
+                            <p:childTnLst>
+                              <p:par>
+                                <p:cTn id="26" presetID="10" presetClass="entr" presetSubtype="0" fill="hold" nodeType="clickEffect">
+                                  <p:stCondLst>
+                                    <p:cond delay="0"/>
+                                  </p:stCondLst>
+                                  <p:childTnLst>
+                                    <p:set>
+                                      <p:cBhvr>
+                                        <p:cTn id="27" dur="1" fill="hold">
+                                          <p:stCondLst>
+                                            <p:cond delay="0"/>
+                                          </p:stCondLst>
+                                        </p:cTn>
+                                        <p:tgtEl>
+                                          <p:spTgt spid="21"/>
+                                        </p:tgtEl>
+                                        <p:attrNameLst>
+                                          <p:attrName>style.visibility</p:attrName>
+                                        </p:attrNameLst>
+                                      </p:cBhvr>
+                                      <p:to>
+                                        <p:strVal val="visible"/>
+                                      </p:to>
+                                    </p:set>
+                                    <p:animEffect transition="in" filter="fade">
+                                      <p:cBhvr>
+                                        <p:cTn id="28" dur="500"/>
+                                        <p:tgtEl>
+                                          <p:spTgt spid="21"/>
+                                        </p:tgtEl>
+                                      </p:cBhvr>
+                                    </p:animEffect>
+                                  </p:childTnLst>
+                                </p:cTn>
+                              </p:par>
+                            </p:childTnLst>
+                          </p:cTn>
+                        </p:par>
+                      </p:childTnLst>
+                    </p:cTn>
+                  </p:par>
+                  <p:par>
+                    <p:cTn id="29" fill="hold">
+                      <p:stCondLst>
+                        <p:cond delay="indefinite"/>
+                      </p:stCondLst>
+                      <p:childTnLst>
+                        <p:par>
+                          <p:cTn id="30" fill="hold">
+                            <p:stCondLst>
+                              <p:cond delay="0"/>
+                            </p:stCondLst>
+                            <p:childTnLst>
+                              <p:par>
+                                <p:cTn id="31" presetID="10" presetClass="entr" presetSubtype="0" fill="hold" nodeType="clickEffect">
+                                  <p:stCondLst>
+                                    <p:cond delay="0"/>
+                                  </p:stCondLst>
+                                  <p:childTnLst>
+                                    <p:set>
+                                      <p:cBhvr>
+                                        <p:cTn id="32" dur="1" fill="hold">
+                                          <p:stCondLst>
+                                            <p:cond delay="0"/>
+                                          </p:stCondLst>
+                                        </p:cTn>
+                                        <p:tgtEl>
+                                          <p:spTgt spid="39"/>
+                                        </p:tgtEl>
+                                        <p:attrNameLst>
+                                          <p:attrName>style.visibility</p:attrName>
+                                        </p:attrNameLst>
+                                      </p:cBhvr>
+                                      <p:to>
+                                        <p:strVal val="visible"/>
+                                      </p:to>
+                                    </p:set>
+                                    <p:animEffect transition="in" filter="fade">
+                                      <p:cBhvr>
+                                        <p:cTn id="33" dur="500"/>
+                                        <p:tgtEl>
+                                          <p:spTgt spid="39"/>
+                                        </p:tgtEl>
+                                      </p:cBhvr>
+                                    </p:animEffect>
+                                  </p:childTnLst>
+                                </p:cTn>
+                              </p:par>
+                            </p:childTnLst>
+                          </p:cTn>
+                        </p:par>
+                      </p:childTnLst>
+                    </p:cTn>
+                  </p:par>
+                  <p:par>
+                    <p:cTn id="34" fill="hold">
+                      <p:stCondLst>
+                        <p:cond delay="indefinite"/>
+                      </p:stCondLst>
+                      <p:childTnLst>
+                        <p:par>
+                          <p:cTn id="35" fill="hold">
+                            <p:stCondLst>
+                              <p:cond delay="0"/>
+                            </p:stCondLst>
+                            <p:childTnLst>
+                              <p:par>
+                                <p:cTn id="36" presetID="10" presetClass="entr" presetSubtype="0" fill="hold" nodeType="clickEffect">
+                                  <p:stCondLst>
+                                    <p:cond delay="0"/>
+                                  </p:stCondLst>
+                                  <p:childTnLst>
+                                    <p:set>
+                                      <p:cBhvr>
+                                        <p:cTn id="37" dur="1" fill="hold">
+                                          <p:stCondLst>
+                                            <p:cond delay="0"/>
+                                          </p:stCondLst>
+                                        </p:cTn>
+                                        <p:tgtEl>
+                                          <p:spTgt spid="43"/>
+                                        </p:tgtEl>
+                                        <p:attrNameLst>
+                                          <p:attrName>style.visibility</p:attrName>
+                                        </p:attrNameLst>
+                                      </p:cBhvr>
+                                      <p:to>
+                                        <p:strVal val="visible"/>
+                                      </p:to>
+                                    </p:set>
+                                    <p:animEffect transition="in" filter="fade">
+                                      <p:cBhvr>
+                                        <p:cTn id="38" dur="500"/>
+                                        <p:tgtEl>
+                                          <p:spTgt spid="43"/>
+                                        </p:tgtEl>
+                                      </p:cBhvr>
+                                    </p:animEffect>
+                                  </p:childTnLst>
+                                </p:cTn>
+                              </p:par>
+                            </p:childTnLst>
+                          </p:cTn>
+                        </p:par>
+                      </p:childTnLst>
+                    </p:cTn>
+                  </p:par>
+                  <p:par>
+                    <p:cTn id="39" fill="hold">
+                      <p:stCondLst>
+                        <p:cond delay="indefinite"/>
+                      </p:stCondLst>
+                      <p:childTnLst>
+                        <p:par>
+                          <p:cTn id="40" fill="hold">
+                            <p:stCondLst>
+                              <p:cond delay="0"/>
+                            </p:stCondLst>
+                            <p:childTnLst>
+                              <p:par>
+                                <p:cTn id="41" presetID="10" presetClass="entr" presetSubtype="0" fill="hold" nodeType="clickEffect">
+                                  <p:stCondLst>
+                                    <p:cond delay="0"/>
+                                  </p:stCondLst>
+                                  <p:childTnLst>
+                                    <p:set>
+                                      <p:cBhvr>
+                                        <p:cTn id="42" dur="1" fill="hold">
+                                          <p:stCondLst>
+                                            <p:cond delay="0"/>
+                                          </p:stCondLst>
+                                        </p:cTn>
+                                        <p:tgtEl>
+                                          <p:spTgt spid="3"/>
+                                        </p:tgtEl>
+                                        <p:attrNameLst>
+                                          <p:attrName>style.visibility</p:attrName>
+                                        </p:attrNameLst>
+                                      </p:cBhvr>
+                                      <p:to>
+                                        <p:strVal val="visible"/>
+                                      </p:to>
+                                    </p:set>
+                                    <p:animEffect transition="in" filter="fade">
+                                      <p:cBhvr>
+                                        <p:cTn id="43" dur="500"/>
+                                        <p:tgtEl>
+                                          <p:spTgt spid="3"/>
                                         </p:tgtEl>
                                       </p:cBhvr>
                                     </p:animEffect>
@@ -9299,354 +10444,20 @@
                           </p:cTn>
                         </p:par>
                         <p:par>
-                          <p:cTn id="8" fill="hold">
+                          <p:cTn id="44" fill="hold">
                             <p:stCondLst>
-                              <p:cond delay="1500"/>
+                              <p:cond delay="500"/>
                             </p:stCondLst>
                             <p:childTnLst>
                               <p:par>
-                                <p:cTn id="9" presetID="10" presetClass="entr" presetSubtype="0" fill="hold" nodeType="afterEffect">
-                                  <p:stCondLst>
-                                    <p:cond delay="0"/>
-                                  </p:stCondLst>
-                                  <p:childTnLst>
-                                    <p:set>
-                                      <p:cBhvr>
-                                        <p:cTn id="10" dur="1" fill="hold">
-                                          <p:stCondLst>
-                                            <p:cond delay="0"/>
-                                          </p:stCondLst>
-                                        </p:cTn>
-                                        <p:tgtEl>
-                                          <p:spTgt spid="8"/>
-                                        </p:tgtEl>
-                                        <p:attrNameLst>
-                                          <p:attrName>style.visibility</p:attrName>
-                                        </p:attrNameLst>
-                                      </p:cBhvr>
-                                      <p:to>
-                                        <p:strVal val="visible"/>
-                                      </p:to>
-                                    </p:set>
-                                    <p:animEffect transition="in" filter="fade">
-                                      <p:cBhvr>
-                                        <p:cTn id="11" dur="500"/>
-                                        <p:tgtEl>
-                                          <p:spTgt spid="8"/>
-                                        </p:tgtEl>
-                                      </p:cBhvr>
-                                    </p:animEffect>
-                                  </p:childTnLst>
-                                </p:cTn>
-                              </p:par>
-                            </p:childTnLst>
-                          </p:cTn>
-                        </p:par>
-                        <p:par>
-                          <p:cTn id="12" fill="hold">
-                            <p:stCondLst>
-                              <p:cond delay="2000"/>
-                            </p:stCondLst>
-                            <p:childTnLst>
-                              <p:par>
-                                <p:cTn id="13" presetID="10" presetClass="entr" presetSubtype="0" fill="hold" nodeType="afterEffect">
-                                  <p:stCondLst>
-                                    <p:cond delay="0"/>
-                                  </p:stCondLst>
-                                  <p:childTnLst>
-                                    <p:set>
-                                      <p:cBhvr>
-                                        <p:cTn id="14" dur="1" fill="hold">
-                                          <p:stCondLst>
-                                            <p:cond delay="0"/>
-                                          </p:stCondLst>
-                                        </p:cTn>
-                                        <p:tgtEl>
-                                          <p:spTgt spid="21"/>
-                                        </p:tgtEl>
-                                        <p:attrNameLst>
-                                          <p:attrName>style.visibility</p:attrName>
-                                        </p:attrNameLst>
-                                      </p:cBhvr>
-                                      <p:to>
-                                        <p:strVal val="visible"/>
-                                      </p:to>
-                                    </p:set>
-                                    <p:animEffect transition="in" filter="fade">
-                                      <p:cBhvr>
-                                        <p:cTn id="15" dur="500"/>
-                                        <p:tgtEl>
-                                          <p:spTgt spid="21"/>
-                                        </p:tgtEl>
-                                      </p:cBhvr>
-                                    </p:animEffect>
-                                  </p:childTnLst>
-                                </p:cTn>
-                              </p:par>
-                            </p:childTnLst>
-                          </p:cTn>
-                        </p:par>
-                        <p:par>
-                          <p:cTn id="16" fill="hold">
-                            <p:stCondLst>
-                              <p:cond delay="2500"/>
-                            </p:stCondLst>
-                            <p:childTnLst>
-                              <p:par>
-                                <p:cTn id="17" presetID="10" presetClass="entr" presetSubtype="0" fill="hold" nodeType="afterEffect">
-                                  <p:stCondLst>
-                                    <p:cond delay="0"/>
-                                  </p:stCondLst>
-                                  <p:childTnLst>
-                                    <p:set>
-                                      <p:cBhvr>
-                                        <p:cTn id="18" dur="1" fill="hold">
-                                          <p:stCondLst>
-                                            <p:cond delay="0"/>
-                                          </p:stCondLst>
-                                        </p:cTn>
-                                        <p:tgtEl>
-                                          <p:spTgt spid="39"/>
-                                        </p:tgtEl>
-                                        <p:attrNameLst>
-                                          <p:attrName>style.visibility</p:attrName>
-                                        </p:attrNameLst>
-                                      </p:cBhvr>
-                                      <p:to>
-                                        <p:strVal val="visible"/>
-                                      </p:to>
-                                    </p:set>
-                                    <p:animEffect transition="in" filter="fade">
-                                      <p:cBhvr>
-                                        <p:cTn id="19" dur="500"/>
-                                        <p:tgtEl>
-                                          <p:spTgt spid="39"/>
-                                        </p:tgtEl>
-                                      </p:cBhvr>
-                                    </p:animEffect>
-                                  </p:childTnLst>
-                                </p:cTn>
-                              </p:par>
-                            </p:childTnLst>
-                          </p:cTn>
-                        </p:par>
-                        <p:par>
-                          <p:cTn id="20" fill="hold">
-                            <p:stCondLst>
-                              <p:cond delay="3000"/>
-                            </p:stCondLst>
-                            <p:childTnLst>
-                              <p:par>
-                                <p:cTn id="21" presetID="10" presetClass="entr" presetSubtype="0" fill="hold" nodeType="afterEffect">
-                                  <p:stCondLst>
-                                    <p:cond delay="0"/>
-                                  </p:stCondLst>
-                                  <p:childTnLst>
-                                    <p:set>
-                                      <p:cBhvr>
-                                        <p:cTn id="22" dur="1" fill="hold">
-                                          <p:stCondLst>
-                                            <p:cond delay="0"/>
-                                          </p:stCondLst>
-                                        </p:cTn>
-                                        <p:tgtEl>
-                                          <p:spTgt spid="43"/>
-                                        </p:tgtEl>
-                                        <p:attrNameLst>
-                                          <p:attrName>style.visibility</p:attrName>
-                                        </p:attrNameLst>
-                                      </p:cBhvr>
-                                      <p:to>
-                                        <p:strVal val="visible"/>
-                                      </p:to>
-                                    </p:set>
-                                    <p:animEffect transition="in" filter="fade">
-                                      <p:cBhvr>
-                                        <p:cTn id="23" dur="500"/>
-                                        <p:tgtEl>
-                                          <p:spTgt spid="43"/>
-                                        </p:tgtEl>
-                                      </p:cBhvr>
-                                    </p:animEffect>
-                                  </p:childTnLst>
-                                </p:cTn>
-                              </p:par>
-                            </p:childTnLst>
-                          </p:cTn>
-                        </p:par>
-                        <p:par>
-                          <p:cTn id="24" fill="hold">
-                            <p:stCondLst>
-                              <p:cond delay="3500"/>
-                            </p:stCondLst>
-                            <p:childTnLst>
-                              <p:par>
-                                <p:cTn id="25" presetID="10" presetClass="entr" presetSubtype="0" fill="hold" nodeType="afterEffect">
-                                  <p:stCondLst>
-                                    <p:cond delay="0"/>
-                                  </p:stCondLst>
-                                  <p:childTnLst>
-                                    <p:set>
-                                      <p:cBhvr>
-                                        <p:cTn id="26" dur="1" fill="hold">
-                                          <p:stCondLst>
-                                            <p:cond delay="0"/>
-                                          </p:stCondLst>
-                                        </p:cTn>
-                                        <p:tgtEl>
-                                          <p:spTgt spid="3"/>
-                                        </p:tgtEl>
-                                        <p:attrNameLst>
-                                          <p:attrName>style.visibility</p:attrName>
-                                        </p:attrNameLst>
-                                      </p:cBhvr>
-                                      <p:to>
-                                        <p:strVal val="visible"/>
-                                      </p:to>
-                                    </p:set>
-                                    <p:animEffect transition="in" filter="fade">
-                                      <p:cBhvr>
-                                        <p:cTn id="27" dur="500"/>
-                                        <p:tgtEl>
-                                          <p:spTgt spid="3"/>
-                                        </p:tgtEl>
-                                      </p:cBhvr>
-                                    </p:animEffect>
-                                  </p:childTnLst>
-                                </p:cTn>
-                              </p:par>
-                            </p:childTnLst>
-                          </p:cTn>
-                        </p:par>
-                        <p:par>
-                          <p:cTn id="28" fill="hold">
-                            <p:stCondLst>
-                              <p:cond delay="4000"/>
-                            </p:stCondLst>
-                            <p:childTnLst>
-                              <p:par>
-                                <p:cTn id="29" presetID="10" presetClass="entr" presetSubtype="0" fill="hold" nodeType="afterEffect">
-                                  <p:stCondLst>
-                                    <p:cond delay="0"/>
-                                  </p:stCondLst>
-                                  <p:childTnLst>
-                                    <p:set>
-                                      <p:cBhvr>
-                                        <p:cTn id="30" dur="1" fill="hold">
-                                          <p:stCondLst>
-                                            <p:cond delay="0"/>
-                                          </p:stCondLst>
-                                        </p:cTn>
-                                        <p:tgtEl>
-                                          <p:spTgt spid="13"/>
-                                        </p:tgtEl>
-                                        <p:attrNameLst>
-                                          <p:attrName>style.visibility</p:attrName>
-                                        </p:attrNameLst>
-                                      </p:cBhvr>
-                                      <p:to>
-                                        <p:strVal val="visible"/>
-                                      </p:to>
-                                    </p:set>
-                                    <p:animEffect transition="in" filter="fade">
-                                      <p:cBhvr>
-                                        <p:cTn id="31" dur="500"/>
-                                        <p:tgtEl>
-                                          <p:spTgt spid="13"/>
-                                        </p:tgtEl>
-                                      </p:cBhvr>
-                                    </p:animEffect>
-                                  </p:childTnLst>
-                                </p:cTn>
-                              </p:par>
-                              <p:par>
-                                <p:cTn id="32" presetID="10" presetClass="entr" presetSubtype="0" fill="hold" nodeType="withEffect">
-                                  <p:stCondLst>
-                                    <p:cond delay="0"/>
-                                  </p:stCondLst>
-                                  <p:childTnLst>
-                                    <p:set>
-                                      <p:cBhvr>
-                                        <p:cTn id="33" dur="1" fill="hold">
-                                          <p:stCondLst>
-                                            <p:cond delay="0"/>
-                                          </p:stCondLst>
-                                        </p:cTn>
-                                        <p:tgtEl>
-                                          <p:spTgt spid="38"/>
-                                        </p:tgtEl>
-                                        <p:attrNameLst>
-                                          <p:attrName>style.visibility</p:attrName>
-                                        </p:attrNameLst>
-                                      </p:cBhvr>
-                                      <p:to>
-                                        <p:strVal val="visible"/>
-                                      </p:to>
-                                    </p:set>
-                                    <p:animEffect transition="in" filter="fade">
-                                      <p:cBhvr>
-                                        <p:cTn id="34" dur="500"/>
-                                        <p:tgtEl>
-                                          <p:spTgt spid="38"/>
-                                        </p:tgtEl>
-                                      </p:cBhvr>
-                                    </p:animEffect>
-                                  </p:childTnLst>
-                                </p:cTn>
-                              </p:par>
-                              <p:par>
-                                <p:cTn id="35" presetID="10" presetClass="entr" presetSubtype="0" fill="hold" nodeType="withEffect">
-                                  <p:stCondLst>
-                                    <p:cond delay="0"/>
-                                  </p:stCondLst>
-                                  <p:childTnLst>
-                                    <p:set>
-                                      <p:cBhvr>
-                                        <p:cTn id="36" dur="1" fill="hold">
-                                          <p:stCondLst>
-                                            <p:cond delay="0"/>
-                                          </p:stCondLst>
-                                        </p:cTn>
-                                        <p:tgtEl>
-                                          <p:spTgt spid="33"/>
-                                        </p:tgtEl>
-                                        <p:attrNameLst>
-                                          <p:attrName>style.visibility</p:attrName>
-                                        </p:attrNameLst>
-                                      </p:cBhvr>
-                                      <p:to>
-                                        <p:strVal val="visible"/>
-                                      </p:to>
-                                    </p:set>
-                                    <p:animEffect transition="in" filter="fade">
-                                      <p:cBhvr>
-                                        <p:cTn id="37" dur="500"/>
-                                        <p:tgtEl>
-                                          <p:spTgt spid="33"/>
-                                        </p:tgtEl>
-                                      </p:cBhvr>
-                                    </p:animEffect>
-                                  </p:childTnLst>
-                                </p:cTn>
-                              </p:par>
-                            </p:childTnLst>
-                          </p:cTn>
-                        </p:par>
-                        <p:par>
-                          <p:cTn id="38" fill="hold">
-                            <p:stCondLst>
-                              <p:cond delay="4500"/>
-                            </p:stCondLst>
-                            <p:childTnLst>
-                              <p:par>
-                                <p:cTn id="39" presetID="42" presetClass="path" presetSubtype="0" repeatCount="indefinite" accel="50000" decel="50000" autoRev="1" fill="hold" nodeType="afterEffect">
+                                <p:cTn id="45" presetID="42" presetClass="path" presetSubtype="0" repeatCount="indefinite" accel="50000" decel="50000" autoRev="1" fill="hold" nodeType="afterEffect">
                                   <p:stCondLst>
                                     <p:cond delay="0"/>
                                   </p:stCondLst>
                                   <p:childTnLst>
                                     <p:animMotion origin="layout" path="M 1.45833E-6 3.7037E-6 L 0.00143 -0.0257 " pathEditMode="relative" rAng="0" ptsTypes="AA">
                                       <p:cBhvr>
-                                        <p:cTn id="40" dur="3000" fill="hold"/>
+                                        <p:cTn id="46" dur="3000" fill="hold"/>
                                         <p:tgtEl>
                                           <p:spTgt spid="13"/>
                                         </p:tgtEl>
@@ -9691,7 +10502,7 @@
 </p:sld>
 </file>
 
-<file path=ppt/slides/slide5.xml><?xml version="1.0" encoding="utf-8"?>
+<file path=ppt/slides/slide6.xml><?xml version="1.0" encoding="utf-8"?>
 <p:sld xmlns:a="http://schemas.openxmlformats.org/drawingml/2006/main" xmlns:r="http://schemas.openxmlformats.org/officeDocument/2006/relationships" xmlns:p="http://schemas.openxmlformats.org/presentationml/2006/main">
   <p:cSld>
     <p:spTree>
@@ -10141,21 +10952,30 @@
                             </p:childTnLst>
                           </p:cTn>
                         </p:par>
+                      </p:childTnLst>
+                    </p:cTn>
+                  </p:par>
+                  <p:par>
+                    <p:cTn id="8" fill="hold">
+                      <p:stCondLst>
+                        <p:cond delay="indefinite"/>
+                      </p:stCondLst>
+                      <p:childTnLst>
                         <p:par>
-                          <p:cTn id="8" fill="hold">
+                          <p:cTn id="9" fill="hold">
                             <p:stCondLst>
-                              <p:cond delay="500"/>
+                              <p:cond delay="0"/>
                             </p:stCondLst>
                             <p:childTnLst>
                               <p:par>
-                                <p:cTn id="9" presetID="22" presetClass="entr" presetSubtype="8" fill="hold" grpId="0" nodeType="afterEffect">
+                                <p:cTn id="10" presetID="22" presetClass="entr" presetSubtype="8" fill="hold" grpId="0" nodeType="clickEffect">
                                   <p:stCondLst>
                                     <p:cond delay="0"/>
                                   </p:stCondLst>
                                   <p:childTnLst>
                                     <p:set>
                                       <p:cBhvr>
-                                        <p:cTn id="10" dur="1" fill="hold">
+                                        <p:cTn id="11" dur="1" fill="hold">
                                           <p:stCondLst>
                                             <p:cond delay="0"/>
                                           </p:stCondLst>
@@ -10173,7 +10993,7 @@
                                     </p:set>
                                     <p:animEffect transition="in" filter="wipe(left)">
                                       <p:cBhvr>
-                                        <p:cTn id="11" dur="500"/>
+                                        <p:cTn id="12" dur="500"/>
                                         <p:tgtEl>
                                           <p:spTgt spid="3"/>
                                         </p:tgtEl>
@@ -10186,20 +11006,20 @@
                           </p:cTn>
                         </p:par>
                         <p:par>
-                          <p:cTn id="12" fill="hold">
+                          <p:cTn id="13" fill="hold">
                             <p:stCondLst>
-                              <p:cond delay="1000"/>
+                              <p:cond delay="500"/>
                             </p:stCondLst>
                             <p:childTnLst>
                               <p:par>
-                                <p:cTn id="13" presetID="10" presetClass="entr" presetSubtype="0" fill="hold" nodeType="afterEffect">
+                                <p:cTn id="14" presetID="10" presetClass="entr" presetSubtype="0" fill="hold" nodeType="afterEffect">
                                   <p:stCondLst>
                                     <p:cond delay="0"/>
                                   </p:stCondLst>
                                   <p:childTnLst>
                                     <p:set>
                                       <p:cBhvr>
-                                        <p:cTn id="14" dur="1" fill="hold">
+                                        <p:cTn id="15" dur="1" fill="hold">
                                           <p:stCondLst>
                                             <p:cond delay="0"/>
                                           </p:stCondLst>
@@ -10217,9 +11037,115 @@
                                     </p:set>
                                     <p:animEffect transition="in" filter="fade">
                                       <p:cBhvr>
-                                        <p:cTn id="15" dur="500"/>
+                                        <p:cTn id="16" dur="500"/>
                                         <p:tgtEl>
                                           <p:spTgt spid="7"/>
+                                        </p:tgtEl>
+                                      </p:cBhvr>
+                                    </p:animEffect>
+                                  </p:childTnLst>
+                                </p:cTn>
+                              </p:par>
+                            </p:childTnLst>
+                          </p:cTn>
+                        </p:par>
+                      </p:childTnLst>
+                    </p:cTn>
+                  </p:par>
+                  <p:par>
+                    <p:cTn id="17" fill="hold">
+                      <p:stCondLst>
+                        <p:cond delay="indefinite"/>
+                      </p:stCondLst>
+                      <p:childTnLst>
+                        <p:par>
+                          <p:cTn id="18" fill="hold">
+                            <p:stCondLst>
+                              <p:cond delay="0"/>
+                            </p:stCondLst>
+                            <p:childTnLst>
+                              <p:par>
+                                <p:cTn id="19" presetID="10" presetClass="entr" presetSubtype="0" fill="hold" nodeType="clickEffect">
+                                  <p:stCondLst>
+                                    <p:cond delay="0"/>
+                                  </p:stCondLst>
+                                  <p:childTnLst>
+                                    <p:set>
+                                      <p:cBhvr>
+                                        <p:cTn id="20" dur="1" fill="hold">
+                                          <p:stCondLst>
+                                            <p:cond delay="0"/>
+                                          </p:stCondLst>
+                                        </p:cTn>
+                                        <p:tgtEl>
+                                          <p:spTgt spid="9"/>
+                                        </p:tgtEl>
+                                        <p:attrNameLst>
+                                          <p:attrName>style.visibility</p:attrName>
+                                        </p:attrNameLst>
+                                      </p:cBhvr>
+                                      <p:to>
+                                        <p:strVal val="visible"/>
+                                      </p:to>
+                                    </p:set>
+                                    <p:animEffect transition="in" filter="fade">
+                                      <p:cBhvr>
+                                        <p:cTn id="21" dur="500"/>
+                                        <p:tgtEl>
+                                          <p:spTgt spid="9"/>
+                                        </p:tgtEl>
+                                      </p:cBhvr>
+                                    </p:animEffect>
+                                  </p:childTnLst>
+                                </p:cTn>
+                              </p:par>
+                            </p:childTnLst>
+                          </p:cTn>
+                        </p:par>
+                      </p:childTnLst>
+                    </p:cTn>
+                  </p:par>
+                  <p:par>
+                    <p:cTn id="22" fill="hold">
+                      <p:stCondLst>
+                        <p:cond delay="indefinite"/>
+                      </p:stCondLst>
+                      <p:childTnLst>
+                        <p:par>
+                          <p:cTn id="23" fill="hold">
+                            <p:stCondLst>
+                              <p:cond delay="0"/>
+                            </p:stCondLst>
+                            <p:childTnLst>
+                              <p:par>
+                                <p:cTn id="24" presetID="22" presetClass="entr" presetSubtype="2" fill="hold" grpId="0" nodeType="clickEffect">
+                                  <p:stCondLst>
+                                    <p:cond delay="0"/>
+                                  </p:stCondLst>
+                                  <p:childTnLst>
+                                    <p:set>
+                                      <p:cBhvr>
+                                        <p:cTn id="25" dur="1" fill="hold">
+                                          <p:stCondLst>
+                                            <p:cond delay="0"/>
+                                          </p:stCondLst>
+                                        </p:cTn>
+                                        <p:tgtEl>
+                                          <p:spTgt spid="2"/>
+                                        </p:tgtEl>
+                                        <p:attrNameLst>
+                                          <p:attrName>style.visibility</p:attrName>
+                                        </p:attrNameLst>
+                                      </p:cBhvr>
+                                      <p:to>
+                                        <p:strVal val="visible"/>
+                                      </p:to>
+                                    </p:set>
+                                    <p:animEffect transition="in" filter="wipe(right)">
+                                      <p:cBhvr>
+                                        <p:cTn id="26" dur="500"/>
+                                        <p:tgtEl>
+                                          <p:spTgt spid="2"/>
                                         </p:tgtEl>
                                       </p:cBhvr>
                                     </p:animEffect>
@@ -10230,26 +11156,26 @@
                           </p:cTn>
                         </p:par>
                         <p:par>
-                          <p:cTn id="16" fill="hold">
+                          <p:cTn id="27" fill="hold">
                             <p:stCondLst>
-                              <p:cond delay="1500"/>
+                              <p:cond delay="500"/>
                             </p:stCondLst>
                             <p:childTnLst>
                               <p:par>
-                                <p:cTn id="17" presetID="10" presetClass="entr" presetSubtype="0" fill="hold" nodeType="afterEffect">
+                                <p:cTn id="28" presetID="10" presetClass="entr" presetSubtype="0" fill="hold" nodeType="afterEffect">
                                   <p:stCondLst>
                                     <p:cond delay="0"/>
                                   </p:stCondLst>
                                   <p:childTnLst>
                                     <p:set>
                                       <p:cBhvr>
-                                        <p:cTn id="18" dur="1" fill="hold">
+                                        <p:cTn id="29" dur="1" fill="hold">
                                           <p:stCondLst>
                                             <p:cond delay="0"/>
                                           </p:stCondLst>
                                         </p:cTn>
                                         <p:tgtEl>
-                                          <p:spTgt spid="9"/>
+                                          <p:spTgt spid="27"/>
                                         </p:tgtEl>
                                         <p:attrNameLst>
                                           <p:attrName>style.visibility</p:attrName>
@@ -10261,9 +11187,9 @@
                                     </p:set>
                                     <p:animEffect transition="in" filter="fade">
                                       <p:cBhvr>
-                                        <p:cTn id="19" dur="500"/>
-                                        <p:tgtEl>
-                                          <p:spTgt spid="9"/>
+                                        <p:cTn id="30" dur="500"/>
+                                        <p:tgtEl>
+                                          <p:spTgt spid="27"/>
                                         </p:tgtEl>
                                       </p:cBhvr>
                                     </p:animEffect>
@@ -10273,71 +11199,36 @@
                             </p:childTnLst>
                           </p:cTn>
                         </p:par>
+                      </p:childTnLst>
+                    </p:cTn>
+                  </p:par>
+                  <p:par>
+                    <p:cTn id="31" fill="hold">
+                      <p:stCondLst>
+                        <p:cond delay="indefinite"/>
+                      </p:stCondLst>
+                      <p:childTnLst>
                         <p:par>
-                          <p:cTn id="20" fill="hold">
+                          <p:cTn id="32" fill="hold">
                             <p:stCondLst>
-                              <p:cond delay="2000"/>
+                              <p:cond delay="0"/>
                             </p:stCondLst>
                             <p:childTnLst>
                               <p:par>
-                                <p:cTn id="21" presetID="22" presetClass="entr" presetSubtype="2" fill="hold" grpId="0" nodeType="afterEffect">
+                                <p:cTn id="33" presetID="10" presetClass="entr" presetSubtype="0" fill="hold" nodeType="clickEffect">
                                   <p:stCondLst>
                                     <p:cond delay="0"/>
                                   </p:stCondLst>
                                   <p:childTnLst>
                                     <p:set>
                                       <p:cBhvr>
-                                        <p:cTn id="22" dur="1" fill="hold">
+                                        <p:cTn id="34" dur="1" fill="hold">
                                           <p:stCondLst>
                                             <p:cond delay="0"/>
                                           </p:stCondLst>
                                         </p:cTn>
                                         <p:tgtEl>
-                                          <p:spTgt spid="2"/>
-                                        </p:tgtEl>
-                                        <p:attrNameLst>
-                                          <p:attrName>style.visibility</p:attrName>
-                                        </p:attrNameLst>
-                                      </p:cBhvr>
-                                      <p:to>
-                                        <p:strVal val="visible"/>
-                                      </p:to>
-                                    </p:set>
-                                    <p:animEffect transition="in" filter="wipe(right)">
-                                      <p:cBhvr>
-                                        <p:cTn id="23" dur="500"/>
-                                        <p:tgtEl>
-                                          <p:spTgt spid="2"/>
-                                        </p:tgtEl>
-                                      </p:cBhvr>
-                                    </p:animEffect>
-                                  </p:childTnLst>
-                                </p:cTn>
-                              </p:par>
-                            </p:childTnLst>
-                          </p:cTn>
-                        </p:par>
-                        <p:par>
-                          <p:cTn id="24" fill="hold">
-                            <p:stCondLst>
-                              <p:cond delay="2500"/>
-                            </p:stCondLst>
-                            <p:childTnLst>
-                              <p:par>
-                                <p:cTn id="25" presetID="10" presetClass="entr" presetSubtype="0" fill="hold" nodeType="afterEffect">
-                                  <p:stCondLst>
-                                    <p:cond delay="0"/>
-                                  </p:stCondLst>
-                                  <p:childTnLst>
-                                    <p:set>
-                                      <p:cBhvr>
-                                        <p:cTn id="26" dur="1" fill="hold">
-                                          <p:stCondLst>
-                                            <p:cond delay="0"/>
-                                          </p:stCondLst>
-                                        </p:cTn>
-                                        <p:tgtEl>
-                                          <p:spTgt spid="27"/>
+                                          <p:spTgt spid="13"/>
                                         </p:tgtEl>
                                         <p:attrNameLst>
                                           <p:attrName>style.visibility</p:attrName>
@@ -10349,51 +11240,7 @@
                                     </p:set>
                                     <p:animEffect transition="in" filter="fade">
                                       <p:cBhvr>
-                                        <p:cTn id="27" dur="500"/>
-                                        <p:tgtEl>
-                                          <p:spTgt spid="27"/>
-                                        </p:tgtEl>
-                                      </p:cBhvr>
-                                    </p:animEffect>
-                                  </p:childTnLst>
-                                </p:cTn>
-                              </p:par>
-                            </p:childTnLst>
-                          </p:cTn>
-                        </p:par>
-                        <p:par>
-                          <p:cTn id="28" fill="hold">
-                            <p:stCondLst>
-                              <p:cond delay="3000"/>
-                            </p:stCondLst>
-                            <p:childTnLst>
-                              <p:par>
-                                <p:cTn id="29" presetID="10" presetClass="entr" presetSubtype="0" fill="hold" nodeType="afterEffect">
-                                  <p:stCondLst>
-                                    <p:cond delay="0"/>
-                                  </p:stCondLst>
-                                  <p:childTnLst>
-                                    <p:set>
-                                      <p:cBhvr>
-                                        <p:cTn id="30" dur="1" fill="hold">
-                                          <p:stCondLst>
-                                            <p:cond delay="0"/>
-                                          </p:stCondLst>
-                                        </p:cTn>
-                                        <p:tgtEl>
-                                          <p:spTgt spid="13"/>
-                                        </p:tgtEl>
-                                        <p:attrNameLst>
-                                          <p:attrName>style.visibility</p:attrName>
-                                        </p:attrNameLst>
-                                      </p:cBhvr>
-                                      <p:to>
-                                        <p:strVal val="visible"/>
-                                      </p:to>
-                                    </p:set>
-                                    <p:animEffect transition="in" filter="fade">
-                                      <p:cBhvr>
-                                        <p:cTn id="31" dur="500"/>
+                                        <p:cTn id="35" dur="500"/>
                                         <p:tgtEl>
                                           <p:spTgt spid="13"/>
                                         </p:tgtEl>
@@ -10403,14 +11250,14 @@
                                 </p:cTn>
                               </p:par>
                               <p:par>
-                                <p:cTn id="32" presetID="6" presetClass="emph" presetSubtype="0" repeatCount="indefinite" autoRev="1" fill="remove" nodeType="withEffect">
+                                <p:cTn id="36" presetID="6" presetClass="emph" presetSubtype="0" repeatCount="indefinite" autoRev="1" fill="remove" nodeType="withEffect">
                                   <p:stCondLst>
                                     <p:cond delay="0"/>
                                   </p:stCondLst>
                                   <p:childTnLst>
                                     <p:animScale>
                                       <p:cBhvr>
-                                        <p:cTn id="33" dur="3000" fill="hold"/>
+                                        <p:cTn id="37" dur="3000" fill="hold"/>
                                         <p:tgtEl>
                                           <p:spTgt spid="5"/>
                                         </p:tgtEl>
@@ -10455,7 +11302,7 @@
 </p:sld>
 </file>
 
-<file path=ppt/slides/slide6.xml><?xml version="1.0" encoding="utf-8"?>
+<file path=ppt/slides/slide7.xml><?xml version="1.0" encoding="utf-8"?>
 <p:sld xmlns:a="http://schemas.openxmlformats.org/drawingml/2006/main" xmlns:r="http://schemas.openxmlformats.org/officeDocument/2006/relationships" xmlns:p="http://schemas.openxmlformats.org/presentationml/2006/main">
   <p:cSld>
     <p:spTree>
@@ -10673,7 +11520,7 @@
 </p:sld>
 </file>
 
-<file path=ppt/slides/slide7.xml><?xml version="1.0" encoding="utf-8"?>
+<file path=ppt/slides/slide8.xml><?xml version="1.0" encoding="utf-8"?>
 <p:sld xmlns:a="http://schemas.openxmlformats.org/drawingml/2006/main" xmlns:r="http://schemas.openxmlformats.org/officeDocument/2006/relationships" xmlns:p="http://schemas.openxmlformats.org/presentationml/2006/main">
   <p:cSld>
     <p:spTree>
@@ -11013,19 +11860,16 @@
                     <p:cTn id="3" fill="hold">
                       <p:stCondLst>
                         <p:cond delay="indefinite"/>
-                        <p:cond evt="onBegin" delay="0">
-                          <p:tn val="2"/>
-                        </p:cond>
                       </p:stCondLst>
                       <p:childTnLst>
                         <p:par>
                           <p:cTn id="4" fill="hold">
                             <p:stCondLst>
-                              <p:cond delay="1000"/>
+                              <p:cond delay="0"/>
                             </p:stCondLst>
                             <p:childTnLst>
                               <p:par>
-                                <p:cTn id="5" presetID="22" presetClass="entr" presetSubtype="8" fill="hold" nodeType="afterEffect">
+                                <p:cTn id="5" presetID="22" presetClass="entr" presetSubtype="8" fill="hold" nodeType="clickEffect">
                                   <p:stCondLst>
                                     <p:cond delay="0"/>
                                   </p:stCondLst>
@@ -11062,21 +11906,30 @@
                             </p:childTnLst>
                           </p:cTn>
                         </p:par>
+                      </p:childTnLst>
+                    </p:cTn>
+                  </p:par>
+                  <p:par>
+                    <p:cTn id="8" fill="hold">
+                      <p:stCondLst>
+                        <p:cond delay="indefinite"/>
+                      </p:stCondLst>
+                      <p:childTnLst>
                         <p:par>
-                          <p:cTn id="8" fill="hold">
+                          <p:cTn id="9" fill="hold">
                             <p:stCondLst>
-                              <p:cond delay="1500"/>
+                              <p:cond delay="0"/>
                             </p:stCondLst>
                             <p:childTnLst>
                               <p:par>
-                                <p:cTn id="9" presetID="22" presetClass="entr" presetSubtype="8" fill="hold" nodeType="afterEffect">
+                                <p:cTn id="10" presetID="22" presetClass="entr" presetSubtype="8" fill="hold" nodeType="clickEffect">
                                   <p:stCondLst>
                                     <p:cond delay="0"/>
                                   </p:stCondLst>
                                   <p:childTnLst>
                                     <p:set>
                                       <p:cBhvr>
-                                        <p:cTn id="10" dur="1" fill="hold">
+                                        <p:cTn id="11" dur="1" fill="hold">
                                           <p:stCondLst>
                                             <p:cond delay="0"/>
                                           </p:stCondLst>
@@ -11094,7 +11947,7 @@
                                     </p:set>
                                     <p:animEffect transition="in" filter="wipe(left)">
                                       <p:cBhvr>
-                                        <p:cTn id="11" dur="500"/>
+                                        <p:cTn id="12" dur="500"/>
                                         <p:tgtEl>
                                           <p:spTgt spid="14"/>
                                         </p:tgtEl>
@@ -11106,21 +11959,30 @@
                             </p:childTnLst>
                           </p:cTn>
                         </p:par>
+                      </p:childTnLst>
+                    </p:cTn>
+                  </p:par>
+                  <p:par>
+                    <p:cTn id="13" fill="hold">
+                      <p:stCondLst>
+                        <p:cond delay="indefinite"/>
+                      </p:stCondLst>
+                      <p:childTnLst>
                         <p:par>
-                          <p:cTn id="12" fill="hold">
+                          <p:cTn id="14" fill="hold">
                             <p:stCondLst>
-                              <p:cond delay="2000"/>
+                              <p:cond delay="0"/>
                             </p:stCondLst>
                             <p:childTnLst>
                               <p:par>
-                                <p:cTn id="13" presetID="22" presetClass="entr" presetSubtype="8" fill="hold" nodeType="afterEffect">
+                                <p:cTn id="15" presetID="22" presetClass="entr" presetSubtype="8" fill="hold" nodeType="clickEffect">
                                   <p:stCondLst>
                                     <p:cond delay="0"/>
                                   </p:stCondLst>
                                   <p:childTnLst>
                                     <p:set>
                                       <p:cBhvr>
-                                        <p:cTn id="14" dur="1" fill="hold">
+                                        <p:cTn id="16" dur="1" fill="hold">
                                           <p:stCondLst>
                                             <p:cond delay="0"/>
                                           </p:stCondLst>
@@ -11138,7 +12000,7 @@
                                     </p:set>
                                     <p:animEffect transition="in" filter="wipe(left)">
                                       <p:cBhvr>
-                                        <p:cTn id="15" dur="500"/>
+                                        <p:cTn id="17" dur="500"/>
                                         <p:tgtEl>
                                           <p:spTgt spid="10"/>
                                         </p:tgtEl>
@@ -11150,21 +12012,30 @@
                             </p:childTnLst>
                           </p:cTn>
                         </p:par>
+                      </p:childTnLst>
+                    </p:cTn>
+                  </p:par>
+                  <p:par>
+                    <p:cTn id="18" fill="hold">
+                      <p:stCondLst>
+                        <p:cond delay="indefinite"/>
+                      </p:stCondLst>
+                      <p:childTnLst>
                         <p:par>
-                          <p:cTn id="16" fill="hold">
+                          <p:cTn id="19" fill="hold">
                             <p:stCondLst>
-                              <p:cond delay="2500"/>
+                              <p:cond delay="0"/>
                             </p:stCondLst>
                             <p:childTnLst>
                               <p:par>
-                                <p:cTn id="17" presetID="22" presetClass="entr" presetSubtype="8" fill="hold" nodeType="afterEffect">
+                                <p:cTn id="20" presetID="22" presetClass="entr" presetSubtype="8" fill="hold" nodeType="clickEffect">
                                   <p:stCondLst>
                                     <p:cond delay="0"/>
                                   </p:stCondLst>
                                   <p:childTnLst>
                                     <p:set>
                                       <p:cBhvr>
-                                        <p:cTn id="18" dur="1" fill="hold">
+                                        <p:cTn id="21" dur="1" fill="hold">
                                           <p:stCondLst>
                                             <p:cond delay="0"/>
                                           </p:stCondLst>
@@ -11182,7 +12053,7 @@
                                     </p:set>
                                     <p:animEffect transition="in" filter="wipe(left)">
                                       <p:cBhvr>
-                                        <p:cTn id="19" dur="500"/>
+                                        <p:cTn id="22" dur="500"/>
                                         <p:tgtEl>
                                           <p:spTgt spid="24"/>
                                         </p:tgtEl>
@@ -11222,7 +12093,7 @@
 </p:sld>
 </file>
 
-<file path=ppt/slides/slide8.xml><?xml version="1.0" encoding="utf-8"?>
+<file path=ppt/slides/slide9.xml><?xml version="1.0" encoding="utf-8"?>
 <p:sld xmlns:a="http://schemas.openxmlformats.org/drawingml/2006/main" xmlns:r="http://schemas.openxmlformats.org/officeDocument/2006/relationships" xmlns:p="http://schemas.openxmlformats.org/presentationml/2006/main">
   <p:cSld>
     <p:spTree>
@@ -11407,638 +12278,6 @@
                                         </p:tgtEl>
                                       </p:cBhvr>
                                     </p:animEffect>
-                                  </p:childTnLst>
-                                </p:cTn>
-                              </p:par>
-                            </p:childTnLst>
-                          </p:cTn>
-                        </p:par>
-                      </p:childTnLst>
-                    </p:cTn>
-                  </p:par>
-                </p:childTnLst>
-              </p:cTn>
-              <p:prevCondLst>
-                <p:cond evt="onPrev" delay="0">
-                  <p:tgtEl>
-                    <p:sldTgt/>
-                  </p:tgtEl>
-                </p:cond>
-              </p:prevCondLst>
-              <p:nextCondLst>
-                <p:cond evt="onNext" delay="0">
-                  <p:tgtEl>
-                    <p:sldTgt/>
-                  </p:tgtEl>
-                </p:cond>
-              </p:nextCondLst>
-            </p:seq>
-          </p:childTnLst>
-        </p:cTn>
-      </p:par>
-    </p:tnLst>
-  </p:timing>
-</p:sld>
-</file>
-
-<file path=ppt/slides/slide9.xml><?xml version="1.0" encoding="utf-8"?>
-<p:sld xmlns:a="http://schemas.openxmlformats.org/drawingml/2006/main" xmlns:r="http://schemas.openxmlformats.org/officeDocument/2006/relationships" xmlns:p="http://schemas.openxmlformats.org/presentationml/2006/main">
-  <p:cSld>
-    <p:spTree>
-      <p:nvGrpSpPr>
-        <p:cNvPr id="1" name=""/>
-        <p:cNvGrpSpPr/>
-        <p:nvPr/>
-      </p:nvGrpSpPr>
-      <p:grpSpPr>
-        <a:xfrm>
-          <a:off x="0" y="0"/>
-          <a:ext cx="0" cy="0"/>
-          <a:chOff x="0" y="0"/>
-          <a:chExt cx="0" cy="0"/>
-        </a:xfrm>
-      </p:grpSpPr>
-      <p:sp>
-        <p:nvSpPr>
-          <p:cNvPr id="20" name="Background">
-            <a:extLst>
-              <a:ext uri="{FF2B5EF4-FFF2-40B4-BE49-F238E27FC236}">
-                <a16:creationId xmlns:a16="http://schemas.microsoft.com/office/drawing/2014/main" id="{93C5F432-CE61-438A-AC80-8DF03B9FB67C}"/>
-              </a:ext>
-            </a:extLst>
-          </p:cNvPr>
-          <p:cNvSpPr/>
-          <p:nvPr/>
-        </p:nvSpPr>
-        <p:spPr>
-          <a:xfrm>
-            <a:off x="0" y="0"/>
-            <a:ext cx="12190646" cy="6858000"/>
-          </a:xfrm>
-          <a:prstGeom prst="rect">
-            <a:avLst/>
-          </a:prstGeom>
-          <a:solidFill>
-            <a:srgbClr val="5475B9"/>
-          </a:solidFill>
-          <a:ln>
-            <a:solidFill>
-              <a:srgbClr val="5475B9"/>
-            </a:solidFill>
-          </a:ln>
-        </p:spPr>
-        <p:style>
-          <a:lnRef idx="2">
-            <a:schemeClr val="accent1">
-              <a:shade val="50000"/>
-            </a:schemeClr>
-          </a:lnRef>
-          <a:fillRef idx="1">
-            <a:schemeClr val="accent1"/>
-          </a:fillRef>
-          <a:effectRef idx="0">
-            <a:schemeClr val="accent1"/>
-          </a:effectRef>
-          <a:fontRef idx="minor">
-            <a:schemeClr val="lt1"/>
-          </a:fontRef>
-        </p:style>
-        <p:txBody>
-          <a:bodyPr rtlCol="0" anchor="ctr"/>
-          <a:lstStyle/>
-          <a:p>
-            <a:pPr algn="ctr"/>
-            <a:endParaRPr lang="pt-PT"/>
-          </a:p>
-        </p:txBody>
-      </p:sp>
-      <p:pic>
-        <p:nvPicPr>
-          <p:cNvPr id="5" name="Seal">
-            <a:extLst>
-              <a:ext uri="{FF2B5EF4-FFF2-40B4-BE49-F238E27FC236}">
-                <a16:creationId xmlns:a16="http://schemas.microsoft.com/office/drawing/2014/main" id="{F5A30996-7E87-4A4F-B2EC-1559590D8047}"/>
-              </a:ext>
-            </a:extLst>
-          </p:cNvPr>
-          <p:cNvPicPr>
-            <a:picLocks noChangeAspect="1"/>
-          </p:cNvPicPr>
-          <p:nvPr/>
-        </p:nvPicPr>
-        <p:blipFill>
-          <a:blip r:embed="rId2">
-            <a:extLst>
-              <a:ext uri="{28A0092B-C50C-407E-A947-70E740481C1C}">
-                <a14:useLocalDpi xmlns:a14="http://schemas.microsoft.com/office/drawing/2010/main" val="0"/>
-              </a:ext>
-              <a:ext uri="{96DAC541-7B7A-43D3-8B79-37D633B846F1}">
-                <asvg:svgBlip xmlns:asvg="http://schemas.microsoft.com/office/drawing/2016/SVG/main" r:embed="rId3"/>
-              </a:ext>
-            </a:extLst>
-          </a:blip>
-          <a:stretch>
-            <a:fillRect/>
-          </a:stretch>
-        </p:blipFill>
-        <p:spPr>
-          <a:xfrm>
-            <a:off x="4909108" y="985657"/>
-            <a:ext cx="8385849" cy="5929086"/>
-          </a:xfrm>
-          <a:prstGeom prst="rect">
-            <a:avLst/>
-          </a:prstGeom>
-        </p:spPr>
-      </p:pic>
-      <p:grpSp>
-        <p:nvGrpSpPr>
-          <p:cNvPr id="19" name="Wrench">
-            <a:extLst>
-              <a:ext uri="{FF2B5EF4-FFF2-40B4-BE49-F238E27FC236}">
-                <a16:creationId xmlns:a16="http://schemas.microsoft.com/office/drawing/2014/main" id="{083C6A42-DF6D-4445-B2BA-0702070849A5}"/>
-              </a:ext>
-            </a:extLst>
-          </p:cNvPr>
-          <p:cNvGrpSpPr/>
-          <p:nvPr/>
-        </p:nvGrpSpPr>
-        <p:grpSpPr>
-          <a:xfrm>
-            <a:off x="164758" y="-1312798"/>
-            <a:ext cx="5120499" cy="5067191"/>
-            <a:chOff x="164758" y="-1312798"/>
-            <a:chExt cx="5120499" cy="5067191"/>
-          </a:xfrm>
-        </p:grpSpPr>
-        <p:pic>
-          <p:nvPicPr>
-            <p:cNvPr id="18" name="Wrench">
-              <a:extLst>
-                <a:ext uri="{FF2B5EF4-FFF2-40B4-BE49-F238E27FC236}">
-                  <a16:creationId xmlns:a16="http://schemas.microsoft.com/office/drawing/2014/main" id="{474B3EEE-8471-4C7D-A4D1-8FA16332ABBB}"/>
-                </a:ext>
-              </a:extLst>
-            </p:cNvPr>
-            <p:cNvPicPr>
-              <a:picLocks noChangeAspect="1"/>
-            </p:cNvPicPr>
-            <p:nvPr/>
-          </p:nvPicPr>
-          <p:blipFill rotWithShape="1">
-            <a:blip r:embed="rId4">
-              <a:extLst>
-                <a:ext uri="{28A0092B-C50C-407E-A947-70E740481C1C}">
-                  <a14:useLocalDpi xmlns:a14="http://schemas.microsoft.com/office/drawing/2010/main" val="0"/>
-                </a:ext>
-                <a:ext uri="{96DAC541-7B7A-43D3-8B79-37D633B846F1}">
-                  <asvg:svgBlip xmlns:asvg="http://schemas.microsoft.com/office/drawing/2016/SVG/main" r:embed="rId5"/>
-                </a:ext>
-              </a:extLst>
-            </a:blip>
-            <a:srcRect l="36162" t="9524" r="35835" b="7302"/>
-            <a:stretch/>
-          </p:blipFill>
-          <p:spPr>
-            <a:xfrm rot="18821662">
-              <a:off x="2065944" y="535080"/>
-              <a:ext cx="2076966" cy="4361660"/>
-            </a:xfrm>
-            <a:prstGeom prst="rect">
-              <a:avLst/>
-            </a:prstGeom>
-          </p:spPr>
-        </p:pic>
-        <p:pic>
-          <p:nvPicPr>
-            <p:cNvPr id="21" name="Wrench">
-              <a:extLst>
-                <a:ext uri="{FF2B5EF4-FFF2-40B4-BE49-F238E27FC236}">
-                  <a16:creationId xmlns:a16="http://schemas.microsoft.com/office/drawing/2014/main" id="{A04988F6-20D4-42E9-B332-EA49F17BFFDB}"/>
-                </a:ext>
-              </a:extLst>
-            </p:cNvPr>
-            <p:cNvPicPr>
-              <a:picLocks noChangeAspect="1"/>
-            </p:cNvPicPr>
-            <p:nvPr/>
-          </p:nvPicPr>
-          <p:blipFill rotWithShape="1">
-            <a:blip r:embed="rId6">
-              <a:extLst>
-                <a:ext uri="{28A0092B-C50C-407E-A947-70E740481C1C}">
-                  <a14:useLocalDpi xmlns:a14="http://schemas.microsoft.com/office/drawing/2010/main" val="0"/>
-                </a:ext>
-                <a:ext uri="{96DAC541-7B7A-43D3-8B79-37D633B846F1}">
-                  <asvg:svgBlip xmlns:asvg="http://schemas.microsoft.com/office/drawing/2016/SVG/main" r:embed="rId7"/>
-                </a:ext>
-              </a:extLst>
-            </a:blip>
-            <a:srcRect l="36162" t="9524" r="35835" b="7302"/>
-            <a:stretch/>
-          </p:blipFill>
-          <p:spPr>
-            <a:xfrm rot="8178338" flipH="1">
-              <a:off x="164758" y="-1312798"/>
-              <a:ext cx="2076966" cy="4361660"/>
-            </a:xfrm>
-            <a:prstGeom prst="rect">
-              <a:avLst/>
-            </a:prstGeom>
-          </p:spPr>
-        </p:pic>
-      </p:grpSp>
-      <p:pic>
-        <p:nvPicPr>
-          <p:cNvPr id="34" name="Graphic 33">
-            <a:extLst>
-              <a:ext uri="{FF2B5EF4-FFF2-40B4-BE49-F238E27FC236}">
-                <a16:creationId xmlns:a16="http://schemas.microsoft.com/office/drawing/2014/main" id="{7AE9779E-6EE1-4C8C-A06C-2ABE0FD96C65}"/>
-              </a:ext>
-            </a:extLst>
-          </p:cNvPr>
-          <p:cNvPicPr>
-            <a:picLocks noChangeAspect="1"/>
-          </p:cNvPicPr>
-          <p:nvPr/>
-        </p:nvPicPr>
-        <p:blipFill>
-          <a:blip r:embed="rId8">
-            <a:extLst>
-              <a:ext uri="{28A0092B-C50C-407E-A947-70E740481C1C}">
-                <a14:useLocalDpi xmlns:a14="http://schemas.microsoft.com/office/drawing/2010/main" val="0"/>
-              </a:ext>
-              <a:ext uri="{96DAC541-7B7A-43D3-8B79-37D633B846F1}">
-                <asvg:svgBlip xmlns:asvg="http://schemas.microsoft.com/office/drawing/2016/SVG/main" r:embed="rId9"/>
-              </a:ext>
-            </a:extLst>
-          </a:blip>
-          <a:stretch>
-            <a:fillRect/>
-          </a:stretch>
-        </p:blipFill>
-        <p:spPr>
-          <a:xfrm>
-            <a:off x="8196918" y="2257131"/>
-            <a:ext cx="1810228" cy="1810228"/>
-          </a:xfrm>
-          <a:prstGeom prst="rect">
-            <a:avLst/>
-          </a:prstGeom>
-        </p:spPr>
-      </p:pic>
-    </p:spTree>
-    <p:extLst>
-      <p:ext uri="{BB962C8B-B14F-4D97-AF65-F5344CB8AC3E}">
-        <p14:creationId xmlns:p14="http://schemas.microsoft.com/office/powerpoint/2010/main" val="1971902515"/>
-      </p:ext>
-    </p:extLst>
-  </p:cSld>
-  <p:clrMapOvr>
-    <a:masterClrMapping/>
-  </p:clrMapOvr>
-  <mc:AlternateContent xmlns:mc="http://schemas.openxmlformats.org/markup-compatibility/2006" xmlns:p15="http://schemas.microsoft.com/office/powerpoint/2012/main">
-    <mc:Choice Requires="p15">
-      <p:transition xmlns:p14="http://schemas.microsoft.com/office/powerpoint/2010/main" spd="slow" p14:dur="1250">
-        <p15:prstTrans prst="peelOff"/>
-      </p:transition>
-    </mc:Choice>
-    <mc:Fallback xmlns="">
-      <p:transition spd="slow">
-        <p:fade/>
-      </p:transition>
-    </mc:Fallback>
-  </mc:AlternateContent>
-  <p:timing>
-    <p:tnLst>
-      <p:par>
-        <p:cTn id="1" dur="indefinite" restart="never" nodeType="tmRoot">
-          <p:childTnLst>
-            <p:seq concurrent="1" nextAc="seek">
-              <p:cTn id="2" dur="indefinite" nodeType="mainSeq">
-                <p:childTnLst>
-                  <p:par>
-                    <p:cTn id="3" fill="hold">
-                      <p:stCondLst>
-                        <p:cond delay="indefinite"/>
-                        <p:cond evt="onBegin" delay="0">
-                          <p:tn val="2"/>
-                        </p:cond>
-                      </p:stCondLst>
-                      <p:childTnLst>
-                        <p:par>
-                          <p:cTn id="4" fill="hold">
-                            <p:stCondLst>
-                              <p:cond delay="0"/>
-                            </p:stCondLst>
-                            <p:childTnLst>
-                              <p:par>
-                                <p:cTn id="5" presetID="2" presetClass="entr" presetSubtype="8" fill="hold" nodeType="withEffect">
-                                  <p:stCondLst>
-                                    <p:cond delay="0"/>
-                                  </p:stCondLst>
-                                  <p:childTnLst>
-                                    <p:set>
-                                      <p:cBhvr>
-                                        <p:cTn id="6" dur="1" fill="hold">
-                                          <p:stCondLst>
-                                            <p:cond delay="0"/>
-                                          </p:stCondLst>
-                                        </p:cTn>
-                                        <p:tgtEl>
-                                          <p:spTgt spid="19"/>
-                                        </p:tgtEl>
-                                        <p:attrNameLst>
-                                          <p:attrName>style.visibility</p:attrName>
-                                        </p:attrNameLst>
-                                      </p:cBhvr>
-                                      <p:to>
-                                        <p:strVal val="visible"/>
-                                      </p:to>
-                                    </p:set>
-                                    <p:anim calcmode="lin" valueType="num">
-                                      <p:cBhvr additive="base">
-                                        <p:cTn id="7" dur="500" fill="hold"/>
-                                        <p:tgtEl>
-                                          <p:spTgt spid="19"/>
-                                        </p:tgtEl>
-                                        <p:attrNameLst>
-                                          <p:attrName>ppt_x</p:attrName>
-                                        </p:attrNameLst>
-                                      </p:cBhvr>
-                                      <p:tavLst>
-                                        <p:tav tm="0">
-                                          <p:val>
-                                            <p:strVal val="0-#ppt_w/2"/>
-                                          </p:val>
-                                        </p:tav>
-                                        <p:tav tm="100000">
-                                          <p:val>
-                                            <p:strVal val="#ppt_x"/>
-                                          </p:val>
-                                        </p:tav>
-                                      </p:tavLst>
-                                    </p:anim>
-                                    <p:anim calcmode="lin" valueType="num">
-                                      <p:cBhvr additive="base">
-                                        <p:cTn id="8" dur="500" fill="hold"/>
-                                        <p:tgtEl>
-                                          <p:spTgt spid="19"/>
-                                        </p:tgtEl>
-                                        <p:attrNameLst>
-                                          <p:attrName>ppt_y</p:attrName>
-                                        </p:attrNameLst>
-                                      </p:cBhvr>
-                                      <p:tavLst>
-                                        <p:tav tm="0">
-                                          <p:val>
-                                            <p:strVal val="#ppt_y"/>
-                                          </p:val>
-                                        </p:tav>
-                                        <p:tav tm="100000">
-                                          <p:val>
-                                            <p:strVal val="#ppt_y"/>
-                                          </p:val>
-                                        </p:tav>
-                                      </p:tavLst>
-                                    </p:anim>
-                                  </p:childTnLst>
-                                </p:cTn>
-                              </p:par>
-                            </p:childTnLst>
-                          </p:cTn>
-                        </p:par>
-                        <p:par>
-                          <p:cTn id="9" fill="hold">
-                            <p:stCondLst>
-                              <p:cond delay="500"/>
-                            </p:stCondLst>
-                            <p:childTnLst>
-                              <p:par>
-                                <p:cTn id="10" presetID="2" presetClass="entr" presetSubtype="2" fill="hold" nodeType="afterEffect">
-                                  <p:stCondLst>
-                                    <p:cond delay="0"/>
-                                  </p:stCondLst>
-                                  <p:childTnLst>
-                                    <p:set>
-                                      <p:cBhvr>
-                                        <p:cTn id="11" dur="1" fill="hold">
-                                          <p:stCondLst>
-                                            <p:cond delay="0"/>
-                                          </p:stCondLst>
-                                        </p:cTn>
-                                        <p:tgtEl>
-                                          <p:spTgt spid="5"/>
-                                        </p:tgtEl>
-                                        <p:attrNameLst>
-                                          <p:attrName>style.visibility</p:attrName>
-                                        </p:attrNameLst>
-                                      </p:cBhvr>
-                                      <p:to>
-                                        <p:strVal val="visible"/>
-                                      </p:to>
-                                    </p:set>
-                                    <p:anim calcmode="lin" valueType="num">
-                                      <p:cBhvr additive="base">
-                                        <p:cTn id="12" dur="500" fill="hold"/>
-                                        <p:tgtEl>
-                                          <p:spTgt spid="5"/>
-                                        </p:tgtEl>
-                                        <p:attrNameLst>
-                                          <p:attrName>ppt_x</p:attrName>
-                                        </p:attrNameLst>
-                                      </p:cBhvr>
-                                      <p:tavLst>
-                                        <p:tav tm="0">
-                                          <p:val>
-                                            <p:strVal val="1+#ppt_w/2"/>
-                                          </p:val>
-                                        </p:tav>
-                                        <p:tav tm="100000">
-                                          <p:val>
-                                            <p:strVal val="#ppt_x"/>
-                                          </p:val>
-                                        </p:tav>
-                                      </p:tavLst>
-                                    </p:anim>
-                                    <p:anim calcmode="lin" valueType="num">
-                                      <p:cBhvr additive="base">
-                                        <p:cTn id="13" dur="500" fill="hold"/>
-                                        <p:tgtEl>
-                                          <p:spTgt spid="5"/>
-                                        </p:tgtEl>
-                                        <p:attrNameLst>
-                                          <p:attrName>ppt_y</p:attrName>
-                                        </p:attrNameLst>
-                                      </p:cBhvr>
-                                      <p:tavLst>
-                                        <p:tav tm="0">
-                                          <p:val>
-                                            <p:strVal val="#ppt_y"/>
-                                          </p:val>
-                                        </p:tav>
-                                        <p:tav tm="100000">
-                                          <p:val>
-                                            <p:strVal val="#ppt_y"/>
-                                          </p:val>
-                                        </p:tav>
-                                      </p:tavLst>
-                                    </p:anim>
-                                  </p:childTnLst>
-                                </p:cTn>
-                              </p:par>
-                            </p:childTnLst>
-                          </p:cTn>
-                        </p:par>
-                        <p:par>
-                          <p:cTn id="14" fill="hold">
-                            <p:stCondLst>
-                              <p:cond delay="1000"/>
-                            </p:stCondLst>
-                            <p:childTnLst>
-                              <p:par>
-                                <p:cTn id="15" presetID="10" presetClass="entr" presetSubtype="0" fill="hold" nodeType="afterEffect">
-                                  <p:stCondLst>
-                                    <p:cond delay="0"/>
-                                  </p:stCondLst>
-                                  <p:childTnLst>
-                                    <p:set>
-                                      <p:cBhvr>
-                                        <p:cTn id="16" dur="1" fill="hold">
-                                          <p:stCondLst>
-                                            <p:cond delay="0"/>
-                                          </p:stCondLst>
-                                        </p:cTn>
-                                        <p:tgtEl>
-                                          <p:spTgt spid="34"/>
-                                        </p:tgtEl>
-                                        <p:attrNameLst>
-                                          <p:attrName>style.visibility</p:attrName>
-                                        </p:attrNameLst>
-                                      </p:cBhvr>
-                                      <p:to>
-                                        <p:strVal val="visible"/>
-                                      </p:to>
-                                    </p:set>
-                                    <p:animEffect transition="in" filter="fade">
-                                      <p:cBhvr>
-                                        <p:cTn id="17" dur="500"/>
-                                        <p:tgtEl>
-                                          <p:spTgt spid="34"/>
-                                        </p:tgtEl>
-                                      </p:cBhvr>
-                                    </p:animEffect>
-                                  </p:childTnLst>
-                                </p:cTn>
-                              </p:par>
-                            </p:childTnLst>
-                          </p:cTn>
-                        </p:par>
-                        <p:par>
-                          <p:cTn id="18" fill="hold">
-                            <p:stCondLst>
-                              <p:cond delay="1500"/>
-                            </p:stCondLst>
-                            <p:childTnLst>
-                              <p:par>
-                                <p:cTn id="19" presetID="32" presetClass="emph" presetSubtype="0" repeatCount="indefinite" fill="hold" nodeType="afterEffect">
-                                  <p:stCondLst>
-                                    <p:cond delay="0"/>
-                                  </p:stCondLst>
-                                  <p:childTnLst>
-                                    <p:animRot by="120000">
-                                      <p:cBhvr>
-                                        <p:cTn id="20" dur="300" fill="hold">
-                                          <p:stCondLst>
-                                            <p:cond delay="0"/>
-                                          </p:stCondLst>
-                                        </p:cTn>
-                                        <p:tgtEl>
-                                          <p:spTgt spid="19"/>
-                                        </p:tgtEl>
-                                        <p:attrNameLst>
-                                          <p:attrName>r</p:attrName>
-                                        </p:attrNameLst>
-                                      </p:cBhvr>
-                                    </p:animRot>
-                                    <p:animRot by="-240000">
-                                      <p:cBhvr>
-                                        <p:cTn id="21" dur="600" fill="hold">
-                                          <p:stCondLst>
-                                            <p:cond delay="600"/>
-                                          </p:stCondLst>
-                                        </p:cTn>
-                                        <p:tgtEl>
-                                          <p:spTgt spid="19"/>
-                                        </p:tgtEl>
-                                        <p:attrNameLst>
-                                          <p:attrName>r</p:attrName>
-                                        </p:attrNameLst>
-                                      </p:cBhvr>
-                                    </p:animRot>
-                                    <p:animRot by="240000">
-                                      <p:cBhvr>
-                                        <p:cTn id="22" dur="600" fill="hold">
-                                          <p:stCondLst>
-                                            <p:cond delay="1200"/>
-                                          </p:stCondLst>
-                                        </p:cTn>
-                                        <p:tgtEl>
-                                          <p:spTgt spid="19"/>
-                                        </p:tgtEl>
-                                        <p:attrNameLst>
-                                          <p:attrName>r</p:attrName>
-                                        </p:attrNameLst>
-                                      </p:cBhvr>
-                                    </p:animRot>
-                                    <p:animRot by="-240000">
-                                      <p:cBhvr>
-                                        <p:cTn id="23" dur="600" fill="hold">
-                                          <p:stCondLst>
-                                            <p:cond delay="1800"/>
-                                          </p:stCondLst>
-                                        </p:cTn>
-                                        <p:tgtEl>
-                                          <p:spTgt spid="19"/>
-                                        </p:tgtEl>
-                                        <p:attrNameLst>
-                                          <p:attrName>r</p:attrName>
-                                        </p:attrNameLst>
-                                      </p:cBhvr>
-                                    </p:animRot>
-                                    <p:animRot by="120000">
-                                      <p:cBhvr>
-                                        <p:cTn id="24" dur="600" fill="hold">
-                                          <p:stCondLst>
-                                            <p:cond delay="2400"/>
-                                          </p:stCondLst>
-                                        </p:cTn>
-                                        <p:tgtEl>
-                                          <p:spTgt spid="19"/>
-                                        </p:tgtEl>
-                                        <p:attrNameLst>
-                                          <p:attrName>r</p:attrName>
-                                        </p:attrNameLst>
-                                      </p:cBhvr>
-                                    </p:animRot>
-                                  </p:childTnLst>
-                                </p:cTn>
-                              </p:par>
-                              <p:par>
-                                <p:cTn id="25" presetID="6" presetClass="emph" presetSubtype="0" repeatCount="indefinite" autoRev="1" fill="hold" nodeType="withEffect">
-                                  <p:stCondLst>
-                                    <p:cond delay="0"/>
-                                  </p:stCondLst>
-                                  <p:childTnLst>
-                                    <p:animScale>
-                                      <p:cBhvr>
-                                        <p:cTn id="26" dur="2000" fill="hold"/>
-                                        <p:tgtEl>
-                                          <p:spTgt spid="34"/>
-                                        </p:tgtEl>
-                                      </p:cBhvr>
-                                      <p:by x="125000" y="125000"/>
-                                    </p:animScale>
                                   </p:childTnLst>
                                 </p:cTn>
                               </p:par>

</xml_diff>